<commit_message>
repo añadido al git
</commit_message>
<xml_diff>
--- a/Entrega_1/0 - REPORTE/Reporte_Grupo5.pptx
+++ b/Entrega_1/0 - REPORTE/Reporte_Grupo5.pptx
@@ -14,7 +14,7 @@
     <p:sldId id="272" r:id="rId5"/>
     <p:sldId id="273" r:id="rId6"/>
     <p:sldId id="274" r:id="rId7"/>
-    <p:sldId id="290" r:id="rId8"/>
+    <p:sldId id="275" r:id="rId8"/>
     <p:sldId id="291" r:id="rId9"/>
     <p:sldId id="277" r:id="rId10"/>
     <p:sldId id="278" r:id="rId11"/>
@@ -314,54 +314,79 @@
 <pc:chgInfo xmlns:a="http://schemas.openxmlformats.org/drawingml/2006/main" xmlns:r="http://schemas.openxmlformats.org/officeDocument/2006/relationships" xmlns:ac="http://schemas.microsoft.com/office/drawing/2013/main/command" xmlns:pc="http://schemas.microsoft.com/office/powerpoint/2013/main/command">
   <pc:docChgLst>
     <pc:chgData name="Mario Aragón Valderrama" userId="ab42593c9091a3c7" providerId="LiveId" clId="{A94EC9C8-FC2E-45B4-829C-AEB6B286F687}"/>
-    <pc:docChg chg="modSld">
-      <pc:chgData name="Mario Aragón Valderrama" userId="ab42593c9091a3c7" providerId="LiveId" clId="{A94EC9C8-FC2E-45B4-829C-AEB6B286F687}" dt="2025-11-10T12:21:22.020" v="256" actId="1076"/>
+    <pc:docChg chg="custSel delSld modSld">
+      <pc:chgData name="Mario Aragón Valderrama" userId="ab42593c9091a3c7" providerId="LiveId" clId="{A94EC9C8-FC2E-45B4-829C-AEB6B286F687}" dt="2025-11-11T08:11:25.234" v="70" actId="20577"/>
       <pc:docMkLst>
         <pc:docMk/>
       </pc:docMkLst>
-      <pc:sldChg chg="modSp mod">
-        <pc:chgData name="Mario Aragón Valderrama" userId="ab42593c9091a3c7" providerId="LiveId" clId="{A94EC9C8-FC2E-45B4-829C-AEB6B286F687}" dt="2025-11-10T12:21:22.020" v="256" actId="1076"/>
+      <pc:sldChg chg="addSp delSp modSp mod">
+        <pc:chgData name="Mario Aragón Valderrama" userId="ab42593c9091a3c7" providerId="LiveId" clId="{A94EC9C8-FC2E-45B4-829C-AEB6B286F687}" dt="2025-11-11T08:11:25.234" v="70" actId="20577"/>
         <pc:sldMkLst>
           <pc:docMk/>
-          <pc:sldMk cId="3729417740" sldId="280"/>
+          <pc:sldMk cId="804811583" sldId="284"/>
         </pc:sldMkLst>
-        <pc:spChg chg="mod">
-          <ac:chgData name="Mario Aragón Valderrama" userId="ab42593c9091a3c7" providerId="LiveId" clId="{A94EC9C8-FC2E-45B4-829C-AEB6B286F687}" dt="2025-11-10T12:20:55.416" v="233" actId="14100"/>
+        <pc:spChg chg="del">
+          <ac:chgData name="Mario Aragón Valderrama" userId="ab42593c9091a3c7" providerId="LiveId" clId="{A94EC9C8-FC2E-45B4-829C-AEB6B286F687}" dt="2025-11-10T20:35:09.027" v="35" actId="478"/>
           <ac:spMkLst>
             <pc:docMk/>
-            <pc:sldMk cId="3729417740" sldId="280"/>
-            <ac:spMk id="63" creationId="{DAAC3287-95C6-BA1F-9A87-A2ACA773479C}"/>
+            <pc:sldMk cId="804811583" sldId="284"/>
+            <ac:spMk id="3" creationId="{CBB543AC-28C6-CB87-2130-192D13526D85}"/>
           </ac:spMkLst>
         </pc:spChg>
         <pc:spChg chg="mod">
-          <ac:chgData name="Mario Aragón Valderrama" userId="ab42593c9091a3c7" providerId="LiveId" clId="{A94EC9C8-FC2E-45B4-829C-AEB6B286F687}" dt="2025-11-10T12:21:22.020" v="256" actId="1076"/>
+          <ac:chgData name="Mario Aragón Valderrama" userId="ab42593c9091a3c7" providerId="LiveId" clId="{A94EC9C8-FC2E-45B4-829C-AEB6B286F687}" dt="2025-11-11T08:11:25.234" v="70" actId="20577"/>
           <ac:spMkLst>
             <pc:docMk/>
-            <pc:sldMk cId="3729417740" sldId="280"/>
-            <ac:spMk id="587" creationId="{F5FADC25-6962-68E7-217A-0BA156D5F24E}"/>
+            <pc:sldMk cId="804811583" sldId="284"/>
+            <ac:spMk id="4" creationId="{CE81DE5E-6259-79DC-5572-F796569C1956}"/>
           </ac:spMkLst>
         </pc:spChg>
+        <pc:spChg chg="del">
+          <ac:chgData name="Mario Aragón Valderrama" userId="ab42593c9091a3c7" providerId="LiveId" clId="{A94EC9C8-FC2E-45B4-829C-AEB6B286F687}" dt="2025-11-10T20:35:11.658" v="36" actId="478"/>
+          <ac:spMkLst>
+            <pc:docMk/>
+            <pc:sldMk cId="804811583" sldId="284"/>
+            <ac:spMk id="5" creationId="{1B72F570-8C4E-D03D-19B6-735E5B05BD2C}"/>
+          </ac:spMkLst>
+        </pc:spChg>
+        <pc:spChg chg="add mod">
+          <ac:chgData name="Mario Aragón Valderrama" userId="ab42593c9091a3c7" providerId="LiveId" clId="{A94EC9C8-FC2E-45B4-829C-AEB6B286F687}" dt="2025-11-10T20:39:46.927" v="62" actId="207"/>
+          <ac:spMkLst>
+            <pc:docMk/>
+            <pc:sldMk cId="804811583" sldId="284"/>
+            <ac:spMk id="6" creationId="{AC91448B-C5FD-2F6A-EAA6-A234D728F93C}"/>
+          </ac:spMkLst>
+        </pc:spChg>
+        <pc:spChg chg="mod">
+          <ac:chgData name="Mario Aragón Valderrama" userId="ab42593c9091a3c7" providerId="LiveId" clId="{A94EC9C8-FC2E-45B4-829C-AEB6B286F687}" dt="2025-11-10T20:35:49.956" v="52" actId="1076"/>
+          <ac:spMkLst>
+            <pc:docMk/>
+            <pc:sldMk cId="804811583" sldId="284"/>
+            <ac:spMk id="7" creationId="{DD0C6F00-4574-F599-71F8-148D1AC02A0D}"/>
+          </ac:spMkLst>
+        </pc:spChg>
+        <pc:picChg chg="del">
+          <ac:chgData name="Mario Aragón Valderrama" userId="ab42593c9091a3c7" providerId="LiveId" clId="{A94EC9C8-FC2E-45B4-829C-AEB6B286F687}" dt="2025-11-10T20:34:58.769" v="34" actId="478"/>
+          <ac:picMkLst>
+            <pc:docMk/>
+            <pc:sldMk cId="804811583" sldId="284"/>
+            <ac:picMk id="2" creationId="{633856C8-457E-85C9-545D-9133F826B174}"/>
+          </ac:picMkLst>
+        </pc:picChg>
+        <pc:picChg chg="add mod">
+          <ac:chgData name="Mario Aragón Valderrama" userId="ab42593c9091a3c7" providerId="LiveId" clId="{A94EC9C8-FC2E-45B4-829C-AEB6B286F687}" dt="2025-11-10T20:36:18.515" v="59" actId="1440"/>
+          <ac:picMkLst>
+            <pc:docMk/>
+            <pc:sldMk cId="804811583" sldId="284"/>
+            <ac:picMk id="9" creationId="{DFE34DB1-1DCE-BDDB-C2E6-909DAA0FE4D2}"/>
+          </ac:picMkLst>
+        </pc:picChg>
       </pc:sldChg>
-      <pc:sldChg chg="modSp mod">
-        <pc:chgData name="Mario Aragón Valderrama" userId="ab42593c9091a3c7" providerId="LiveId" clId="{A94EC9C8-FC2E-45B4-829C-AEB6B286F687}" dt="2025-11-10T11:24:48.369" v="208" actId="20577"/>
+      <pc:sldChg chg="del">
+        <pc:chgData name="Mario Aragón Valderrama" userId="ab42593c9091a3c7" providerId="LiveId" clId="{A94EC9C8-FC2E-45B4-829C-AEB6B286F687}" dt="2025-11-10T20:45:57.536" v="63" actId="47"/>
         <pc:sldMkLst>
           <pc:docMk/>
-          <pc:sldMk cId="3535935293" sldId="291"/>
-        </pc:sldMkLst>
-        <pc:spChg chg="mod">
-          <ac:chgData name="Mario Aragón Valderrama" userId="ab42593c9091a3c7" providerId="LiveId" clId="{A94EC9C8-FC2E-45B4-829C-AEB6B286F687}" dt="2025-11-10T11:24:48.369" v="208" actId="20577"/>
-          <ac:spMkLst>
-            <pc:docMk/>
-            <pc:sldMk cId="3535935293" sldId="291"/>
-            <ac:spMk id="3" creationId="{2EEF3947-4909-7EA1-9CA3-22FEB8ED7AAA}"/>
-          </ac:spMkLst>
-        </pc:spChg>
-      </pc:sldChg>
-      <pc:sldChg chg="mod modShow">
-        <pc:chgData name="Mario Aragón Valderrama" userId="ab42593c9091a3c7" providerId="LiveId" clId="{A94EC9C8-FC2E-45B4-829C-AEB6B286F687}" dt="2025-11-10T12:08:54.903" v="209" actId="729"/>
-        <pc:sldMkLst>
-          <pc:docMk/>
-          <pc:sldMk cId="0" sldId="292"/>
+          <pc:sldMk cId="1794189217" sldId="290"/>
         </pc:sldMkLst>
       </pc:sldChg>
     </pc:docChg>
@@ -10515,13 +10540,7 @@
   <p:cSld>
     <p:spTree>
       <p:nvGrpSpPr>
-        <p:cNvPr id="1" name="Shape 617">
-          <a:extLst>
-            <a:ext uri="{FF2B5EF4-FFF2-40B4-BE49-F238E27FC236}">
-              <a16:creationId xmlns:a16="http://schemas.microsoft.com/office/drawing/2014/main" id="{59820B26-AA19-A094-D8E3-7F42E68FE30E}"/>
-            </a:ext>
-          </a:extLst>
-        </p:cNvPr>
+        <p:cNvPr id="1" name="Shape 617"/>
         <p:cNvGrpSpPr/>
         <p:nvPr/>
       </p:nvGrpSpPr>
@@ -10535,13 +10554,7 @@
       </p:grpSpPr>
       <p:sp>
         <p:nvSpPr>
-          <p:cNvPr id="618" name="Google Shape;618;g2b1022eedc3_0_48:notes">
-            <a:extLst>
-              <a:ext uri="{FF2B5EF4-FFF2-40B4-BE49-F238E27FC236}">
-                <a16:creationId xmlns:a16="http://schemas.microsoft.com/office/drawing/2014/main" id="{28157F4D-12C7-6B4B-C378-F6CC2A6BF071}"/>
-              </a:ext>
-            </a:extLst>
-          </p:cNvPr>
+          <p:cNvPr id="618" name="Google Shape;618;g2b1022eedc3_0_48:notes"/>
           <p:cNvSpPr>
             <a:spLocks noGrp="1" noRot="1" noChangeAspect="1"/>
           </p:cNvSpPr>
@@ -10582,13 +10595,7 @@
       </p:sp>
       <p:sp>
         <p:nvSpPr>
-          <p:cNvPr id="619" name="Google Shape;619;g2b1022eedc3_0_48:notes">
-            <a:extLst>
-              <a:ext uri="{FF2B5EF4-FFF2-40B4-BE49-F238E27FC236}">
-                <a16:creationId xmlns:a16="http://schemas.microsoft.com/office/drawing/2014/main" id="{E3FE745A-9DB6-8F30-15C1-2A4BF20C3D5A}"/>
-              </a:ext>
-            </a:extLst>
-          </p:cNvPr>
+          <p:cNvPr id="619" name="Google Shape;619;g2b1022eedc3_0_48:notes"/>
           <p:cNvSpPr txBox="1">
             <a:spLocks noGrp="1"/>
           </p:cNvSpPr>
@@ -10625,11 +10632,6 @@
         </p:txBody>
       </p:sp>
     </p:spTree>
-    <p:extLst>
-      <p:ext uri="{BB962C8B-B14F-4D97-AF65-F5344CB8AC3E}">
-        <p14:creationId xmlns:p14="http://schemas.microsoft.com/office/powerpoint/2010/main" val="3023904523"/>
-      </p:ext>
-    </p:extLst>
   </p:cSld>
   <p:clrMapOvr>
     <a:masterClrMapping/>
@@ -20058,8 +20060,8 @@
         </p:nvSpPr>
         <p:spPr>
           <a:xfrm>
-            <a:off x="782760" y="2842962"/>
-            <a:ext cx="7726804" cy="1569660"/>
+            <a:off x="534539" y="2607967"/>
+            <a:ext cx="8609461" cy="2446824"/>
           </a:xfrm>
           <a:prstGeom prst="rect">
             <a:avLst/>
@@ -20072,213 +20074,515 @@
           </a:bodyPr>
           <a:lstStyle/>
           <a:p>
-            <a:pPr>
+            <a:r>
+              <a:rPr lang="en-GB" sz="1300" b="1" dirty="0"/>
+              <a:t>Naive Bayes:</a:t>
+            </a:r>
+            <a:r>
+              <a:rPr lang="en-GB" sz="1300" dirty="0"/>
+              <a:t> </a:t>
+            </a:r>
+          </a:p>
+          <a:p>
+            <a:pPr marL="285750" indent="-285750">
               <a:buFont typeface="Arial" panose="020B0604020202020204" pitchFamily="34" charset="0"/>
               <a:buChar char="•"/>
             </a:pPr>
             <a:r>
-              <a:rPr lang="en-GB" b="1" dirty="0"/>
-              <a:t>Naive Bayes:</a:t>
-            </a:r>
-            <a:r>
-              <a:rPr lang="en-GB" dirty="0"/>
-              <a:t> se </a:t>
-            </a:r>
-            <a:r>
-              <a:rPr lang="en-GB" dirty="0" err="1"/>
+              <a:rPr lang="en-GB" sz="1300" dirty="0"/>
+              <a:t>Se </a:t>
+            </a:r>
+            <a:r>
+              <a:rPr lang="en-GB" sz="1300" dirty="0" err="1"/>
               <a:t>aplicó</a:t>
             </a:r>
             <a:r>
-              <a:rPr lang="en-GB" dirty="0"/>
+              <a:rPr lang="en-GB" sz="1300" dirty="0"/>
               <a:t> </a:t>
             </a:r>
             <a:r>
-              <a:rPr lang="en-GB" b="1" dirty="0" err="1"/>
-              <a:t>balanceo</a:t>
-            </a:r>
-            <a:r>
-              <a:rPr lang="en-GB" dirty="0"/>
+              <a:rPr lang="en-GB" sz="1300" dirty="0" err="1"/>
+              <a:t>el</a:t>
+            </a:r>
+            <a:r>
+              <a:rPr lang="en-GB" sz="1300" dirty="0"/>
+              <a:t> </a:t>
+            </a:r>
+            <a:r>
+              <a:rPr lang="en-GB" sz="1300" dirty="0">
+                <a:solidFill>
+                  <a:srgbClr val="FF0000"/>
+                </a:solidFill>
+              </a:rPr>
+              <a:t>FAMD</a:t>
+            </a:r>
+            <a:r>
+              <a:rPr lang="en-GB" sz="1300" dirty="0"/>
               <a:t>, </a:t>
             </a:r>
             <a:r>
-              <a:rPr lang="en-GB" dirty="0" err="1"/>
+              <a:rPr lang="en-GB" sz="1300" dirty="0" err="1"/>
               <a:t>obteniendo</a:t>
             </a:r>
             <a:r>
-              <a:rPr lang="en-GB" dirty="0"/>
+              <a:rPr lang="en-GB" sz="1300" dirty="0"/>
               <a:t> </a:t>
             </a:r>
             <a:r>
-              <a:rPr lang="en-GB" dirty="0" err="1"/>
+              <a:rPr lang="en-GB" sz="1300" dirty="0" err="1"/>
               <a:t>una</a:t>
             </a:r>
             <a:r>
-              <a:rPr lang="en-GB" dirty="0"/>
+              <a:rPr lang="en-GB" sz="1300" dirty="0"/>
               <a:t> </a:t>
             </a:r>
             <a:r>
-              <a:rPr lang="en-GB" dirty="0" err="1"/>
+              <a:rPr lang="en-GB" sz="1300" dirty="0" err="1"/>
               <a:t>leve</a:t>
             </a:r>
             <a:r>
-              <a:rPr lang="en-GB" dirty="0"/>
+              <a:rPr lang="en-GB" sz="1300" dirty="0"/>
               <a:t> </a:t>
             </a:r>
             <a:r>
-              <a:rPr lang="en-GB" dirty="0" err="1"/>
+              <a:rPr lang="en-GB" sz="1300" dirty="0" err="1"/>
               <a:t>mejora</a:t>
             </a:r>
             <a:r>
-              <a:rPr lang="en-GB" dirty="0"/>
-              <a:t> </a:t>
-            </a:r>
-            <a:r>
-              <a:rPr lang="en-GB" dirty="0" err="1"/>
+              <a:rPr lang="en-GB" sz="1300" dirty="0"/>
+              <a:t> general </a:t>
+            </a:r>
+            <a:r>
+              <a:rPr lang="en-GB" sz="1300" dirty="0" err="1"/>
               <a:t>en</a:t>
             </a:r>
             <a:r>
-              <a:rPr lang="en-GB" dirty="0"/>
+              <a:rPr lang="en-GB" sz="1300" dirty="0"/>
               <a:t> las </a:t>
             </a:r>
             <a:r>
-              <a:rPr lang="en-GB" dirty="0" err="1"/>
+              <a:rPr lang="en-GB" sz="1300" dirty="0" err="1"/>
               <a:t>métricas</a:t>
             </a:r>
-            <a:r>
-              <a:rPr lang="en-GB" dirty="0"/>
-              <a:t>.</a:t>
-            </a:r>
+            <a:endParaRPr lang="en-GB" sz="1300" dirty="0"/>
           </a:p>
           <a:p>
-            <a:pPr>
+            <a:pPr marL="285750" indent="-285750">
               <a:buFont typeface="Arial" panose="020B0604020202020204" pitchFamily="34" charset="0"/>
               <a:buChar char="•"/>
             </a:pPr>
             <a:r>
-              <a:rPr lang="en-GB" b="1" dirty="0"/>
-              <a:t>KNN (9NN):</a:t>
-            </a:r>
-            <a:r>
-              <a:rPr lang="en-GB" dirty="0"/>
-              <a:t> se </a:t>
-            </a:r>
-            <a:r>
-              <a:rPr lang="en-GB" dirty="0" err="1"/>
-              <a:t>entrenó</a:t>
-            </a:r>
-            <a:r>
-              <a:rPr lang="en-GB" dirty="0"/>
-              <a:t> con </a:t>
-            </a:r>
-            <a:r>
-              <a:rPr lang="en-GB" b="1" dirty="0"/>
-              <a:t>datasets </a:t>
-            </a:r>
-            <a:r>
-              <a:rPr lang="en-GB" b="1" dirty="0" err="1"/>
-              <a:t>balanceados</a:t>
-            </a:r>
-            <a:r>
-              <a:rPr lang="en-GB" dirty="0"/>
-              <a:t> (Over-sampling, Under-sampling, SMOTE, ROSE) y </a:t>
-            </a:r>
-            <a:r>
-              <a:rPr lang="en-GB" b="1" dirty="0"/>
-              <a:t>FAMD</a:t>
-            </a:r>
-            <a:r>
-              <a:rPr lang="en-GB" dirty="0"/>
-              <a:t>.</a:t>
-            </a:r>
+              <a:rPr lang="en-GB" sz="1300" dirty="0"/>
+              <a:t>No se ha </a:t>
+            </a:r>
+            <a:r>
+              <a:rPr lang="en-GB" sz="1300" dirty="0" err="1"/>
+              <a:t>detectado</a:t>
+            </a:r>
+            <a:r>
+              <a:rPr lang="en-GB" sz="1300" dirty="0"/>
+              <a:t> </a:t>
+            </a:r>
+            <a:r>
+              <a:rPr lang="en-GB" sz="1300" dirty="0" err="1"/>
+              <a:t>sobreajuste</a:t>
+            </a:r>
+            <a:endParaRPr lang="en-GB" sz="1300" dirty="0"/>
           </a:p>
           <a:p>
-            <a:pPr marL="742950" lvl="1" indent="-285750">
+            <a:pPr marL="285750" indent="-285750">
               <a:buFont typeface="Arial" panose="020B0604020202020204" pitchFamily="34" charset="0"/>
               <a:buChar char="•"/>
             </a:pPr>
             <a:r>
-              <a:rPr lang="en-GB" b="1" dirty="0"/>
-              <a:t>SMOTE</a:t>
-            </a:r>
-            <a:r>
-              <a:rPr lang="en-GB" dirty="0"/>
-              <a:t> </a:t>
-            </a:r>
-            <a:r>
-              <a:rPr lang="en-GB" dirty="0" err="1"/>
-              <a:t>ofreció</a:t>
-            </a:r>
-            <a:r>
-              <a:rPr lang="en-GB" dirty="0"/>
-              <a:t> </a:t>
-            </a:r>
-            <a:r>
-              <a:rPr lang="en-GB" dirty="0" err="1"/>
-              <a:t>los</a:t>
-            </a:r>
-            <a:r>
-              <a:rPr lang="en-GB" dirty="0"/>
-              <a:t> </a:t>
-            </a:r>
-            <a:r>
-              <a:rPr lang="en-GB" dirty="0" err="1"/>
-              <a:t>mejores</a:t>
-            </a:r>
-            <a:r>
-              <a:rPr lang="en-GB" dirty="0"/>
-              <a:t> </a:t>
-            </a:r>
-            <a:r>
-              <a:rPr lang="en-GB" dirty="0" err="1"/>
-              <a:t>resultados</a:t>
-            </a:r>
-            <a:r>
-              <a:rPr lang="en-GB" dirty="0"/>
-              <a:t>.</a:t>
-            </a:r>
+              <a:rPr lang="en-GB" sz="1300" dirty="0"/>
+              <a:t>No hay </a:t>
+            </a:r>
+            <a:r>
+              <a:rPr lang="en-GB" sz="1300" dirty="0" err="1"/>
+              <a:t>diferencia</a:t>
+            </a:r>
+            <a:r>
+              <a:rPr lang="en-GB" sz="1300" dirty="0"/>
+              <a:t> entre </a:t>
+            </a:r>
+            <a:r>
+              <a:rPr lang="en-GB" sz="1300" dirty="0" err="1"/>
+              <a:t>métodos</a:t>
+            </a:r>
+            <a:r>
+              <a:rPr lang="en-GB" sz="1300" dirty="0"/>
+              <a:t> de </a:t>
+            </a:r>
+            <a:r>
+              <a:rPr lang="en-GB" sz="1300" dirty="0" err="1"/>
+              <a:t>balanceo</a:t>
+            </a:r>
+            <a:endParaRPr lang="en-GB" sz="1300" dirty="0"/>
           </a:p>
           <a:p>
-            <a:pPr marL="742950" lvl="1" indent="-285750">
+            <a:r>
+              <a:rPr lang="en-GB" sz="1300" b="1" dirty="0"/>
+              <a:t>KNN (9NN)</a:t>
+            </a:r>
+          </a:p>
+          <a:p>
+            <a:pPr marL="285750" indent="-285750">
               <a:buFont typeface="Arial" panose="020B0604020202020204" pitchFamily="34" charset="0"/>
               <a:buChar char="•"/>
             </a:pPr>
             <a:r>
-              <a:rPr lang="en-GB" dirty="0"/>
-              <a:t>Se </a:t>
-            </a:r>
-            <a:r>
-              <a:rPr lang="en-GB" dirty="0" err="1"/>
-              <a:t>detectó</a:t>
-            </a:r>
-            <a:r>
-              <a:rPr lang="en-GB" dirty="0"/>
+              <a:rPr lang="en-GB" sz="1300" dirty="0"/>
+              <a:t>Entre </a:t>
+            </a:r>
+            <a:r>
+              <a:rPr lang="en-GB" sz="1300" dirty="0" err="1"/>
+              <a:t>los</a:t>
+            </a:r>
+            <a:r>
+              <a:rPr lang="en-GB" sz="1300" dirty="0"/>
               <a:t> </a:t>
             </a:r>
             <a:r>
-              <a:rPr lang="en-GB" b="1" dirty="0" err="1"/>
-              <a:t>ligero</a:t>
-            </a:r>
-            <a:r>
-              <a:rPr lang="en-GB" b="1" dirty="0"/>
+              <a:rPr lang="en-GB" sz="1300" dirty="0" err="1"/>
+              <a:t>métodos</a:t>
+            </a:r>
+            <a:r>
+              <a:rPr lang="en-GB" sz="1300" dirty="0"/>
+              <a:t> de </a:t>
+            </a:r>
+            <a:r>
+              <a:rPr lang="en-GB" sz="1300" dirty="0" err="1"/>
+              <a:t>balanceo</a:t>
+            </a:r>
+            <a:r>
+              <a:rPr lang="en-GB" sz="1300" dirty="0"/>
+              <a:t>, </a:t>
+            </a:r>
+            <a:r>
+              <a:rPr lang="en-GB" sz="1300" i="1" dirty="0">
+                <a:solidFill>
+                  <a:srgbClr val="7030A0"/>
+                </a:solidFill>
+              </a:rPr>
+              <a:t>SMOTE</a:t>
+            </a:r>
+            <a:r>
+              <a:rPr lang="en-GB" sz="1300" i="1" dirty="0"/>
+              <a:t>, (</a:t>
+            </a:r>
+            <a:r>
+              <a:rPr lang="en-GB" sz="1300" dirty="0" err="1"/>
+              <a:t>ofreció</a:t>
+            </a:r>
+            <a:r>
+              <a:rPr lang="en-GB" sz="1300" dirty="0"/>
               <a:t> </a:t>
             </a:r>
             <a:r>
-              <a:rPr lang="en-GB" b="1" dirty="0" err="1"/>
-              <a:t>sobreajuste</a:t>
-            </a:r>
-            <a:r>
-              <a:rPr lang="en-GB" dirty="0"/>
-              <a:t>.</a:t>
-            </a:r>
-            <a:br>
-              <a:rPr lang="en-GB" dirty="0"/>
-            </a:br>
-            <a:endParaRPr lang="en-GB" dirty="0"/>
+              <a:rPr lang="en-GB" sz="1300" dirty="0" err="1"/>
+              <a:t>los</a:t>
+            </a:r>
+            <a:r>
+              <a:rPr lang="en-GB" sz="1300" dirty="0"/>
+              <a:t> </a:t>
+            </a:r>
+            <a:r>
+              <a:rPr lang="en-GB" sz="1300" dirty="0" err="1"/>
+              <a:t>mejoros</a:t>
+            </a:r>
+            <a:r>
+              <a:rPr lang="en-GB" sz="1300" dirty="0"/>
+              <a:t> </a:t>
+            </a:r>
+            <a:r>
+              <a:rPr lang="en-GB" sz="1300" dirty="0" err="1"/>
+              <a:t>resultados</a:t>
+            </a:r>
+            <a:r>
+              <a:rPr lang="en-GB" sz="1300" dirty="0"/>
+              <a:t> via </a:t>
+            </a:r>
+            <a:r>
+              <a:rPr lang="en-GB" sz="1300" dirty="0" err="1"/>
+              <a:t>poca</a:t>
+            </a:r>
+            <a:r>
+              <a:rPr lang="en-GB" sz="1300" dirty="0"/>
+              <a:t> </a:t>
+            </a:r>
+            <a:r>
+              <a:rPr lang="en-GB" sz="1300" dirty="0" err="1"/>
+              <a:t>diferencia</a:t>
+            </a:r>
+            <a:r>
+              <a:rPr lang="en-GB" sz="1300" dirty="0"/>
+              <a:t>)</a:t>
+            </a:r>
           </a:p>
           <a:p>
+            <a:pPr marL="285750" indent="-285750">
+              <a:buFont typeface="Arial" panose="020B0604020202020204" pitchFamily="34" charset="0"/>
+              <a:buChar char="•"/>
+            </a:pPr>
+            <a:r>
+              <a:rPr lang="en-GB" sz="1300" dirty="0" err="1"/>
+              <a:t>Detección</a:t>
+            </a:r>
+            <a:r>
+              <a:rPr lang="en-GB" sz="1300" dirty="0"/>
+              <a:t> de </a:t>
+            </a:r>
+            <a:r>
+              <a:rPr lang="en-GB" sz="1300" i="1" dirty="0">
+                <a:solidFill>
+                  <a:srgbClr val="7030A0"/>
+                </a:solidFill>
+              </a:rPr>
+              <a:t>ligero </a:t>
+            </a:r>
+            <a:r>
+              <a:rPr lang="en-GB" sz="1300" i="1" dirty="0" err="1">
+                <a:solidFill>
+                  <a:srgbClr val="7030A0"/>
+                </a:solidFill>
+              </a:rPr>
+              <a:t>sobreajuste</a:t>
+            </a:r>
+            <a:endParaRPr lang="en-GB" sz="1300" i="1" dirty="0">
+              <a:solidFill>
+                <a:srgbClr val="7030A0"/>
+              </a:solidFill>
+            </a:endParaRPr>
+          </a:p>
+          <a:p>
+            <a:endParaRPr lang="en-GB" i="1" dirty="0"/>
+          </a:p>
+          <a:p>
+            <a:r>
+              <a:rPr lang="en-GB" sz="1200" i="1" dirty="0"/>
+              <a:t>En ambos temenos </a:t>
+            </a:r>
+            <a:r>
+              <a:rPr lang="en-GB" sz="1200" i="1" dirty="0" err="1"/>
+              <a:t>una</a:t>
+            </a:r>
+            <a:r>
+              <a:rPr lang="en-GB" sz="1200" i="1" dirty="0"/>
+              <a:t> </a:t>
+            </a:r>
+            <a:r>
+              <a:rPr lang="en-GB" sz="1200" i="1" dirty="0" err="1"/>
+              <a:t>alta</a:t>
+            </a:r>
+            <a:r>
+              <a:rPr lang="en-GB" sz="1200" i="1" dirty="0"/>
+              <a:t> </a:t>
+            </a:r>
+            <a:r>
+              <a:rPr lang="en-GB" sz="1200" i="1" dirty="0" err="1"/>
+              <a:t>especificidad</a:t>
+            </a:r>
+            <a:r>
+              <a:rPr lang="en-GB" sz="1200" i="1" dirty="0"/>
+              <a:t>, </a:t>
+            </a:r>
+            <a:r>
+              <a:rPr lang="en-GB" sz="1200" i="1" dirty="0" err="1"/>
+              <a:t>por</a:t>
+            </a:r>
+            <a:r>
+              <a:rPr lang="en-GB" sz="1200" i="1" dirty="0"/>
+              <a:t> lo tanto, </a:t>
+            </a:r>
+            <a:r>
+              <a:rPr lang="en-GB" sz="1200" i="1" dirty="0" err="1"/>
+              <a:t>correcto</a:t>
+            </a:r>
+            <a:r>
+              <a:rPr lang="en-GB" sz="1200" i="1" dirty="0"/>
+              <a:t> para detector </a:t>
+            </a:r>
+            <a:r>
+              <a:rPr lang="en-GB" sz="1200" i="1" dirty="0" err="1"/>
+              <a:t>los</a:t>
+            </a:r>
+            <a:r>
+              <a:rPr lang="en-GB" sz="1200" i="1" dirty="0"/>
+              <a:t> </a:t>
+            </a:r>
+            <a:r>
+              <a:rPr lang="en-GB" sz="1200" i="1" dirty="0" err="1"/>
+              <a:t>casos</a:t>
+            </a:r>
+            <a:r>
+              <a:rPr lang="en-GB" sz="1200" i="1" dirty="0"/>
+              <a:t> </a:t>
+            </a:r>
+            <a:r>
+              <a:rPr lang="en-GB" sz="1200" i="1" dirty="0" err="1"/>
+              <a:t>negativos</a:t>
+            </a:r>
+            <a:r>
+              <a:rPr lang="en-GB" sz="1200" i="1" dirty="0"/>
+              <a:t> </a:t>
+            </a:r>
+            <a:r>
+              <a:rPr lang="en-GB" sz="1200" i="1" dirty="0" err="1"/>
+              <a:t>pero</a:t>
+            </a:r>
+            <a:r>
+              <a:rPr lang="en-GB" sz="1200" i="1" dirty="0"/>
+              <a:t> </a:t>
+            </a:r>
+            <a:r>
+              <a:rPr lang="en-GB" sz="1200" i="1" dirty="0" err="1"/>
+              <a:t>en</a:t>
+            </a:r>
+            <a:r>
+              <a:rPr lang="en-GB" sz="1200" i="1" dirty="0"/>
+              <a:t> </a:t>
+            </a:r>
+            <a:r>
+              <a:rPr lang="en-GB" sz="1200" i="1" dirty="0" err="1"/>
+              <a:t>nuestro</a:t>
+            </a:r>
+            <a:r>
+              <a:rPr lang="en-GB" sz="1200" i="1" dirty="0"/>
+              <a:t> </a:t>
+            </a:r>
+            <a:r>
+              <a:rPr lang="en-GB" sz="1200" i="1" dirty="0" err="1"/>
+              <a:t>estudio</a:t>
+            </a:r>
+            <a:r>
+              <a:rPr lang="en-GB" sz="1200" i="1" dirty="0"/>
+              <a:t> </a:t>
+            </a:r>
+            <a:r>
+              <a:rPr lang="en-GB" sz="1200" i="1" dirty="0" err="1"/>
+              <a:t>nos</a:t>
+            </a:r>
+            <a:r>
+              <a:rPr lang="en-GB" sz="1200" i="1" dirty="0"/>
+              <a:t> </a:t>
+            </a:r>
+            <a:r>
+              <a:rPr lang="en-GB" sz="1200" i="1" dirty="0" err="1"/>
+              <a:t>interesa</a:t>
+            </a:r>
+            <a:r>
+              <a:rPr lang="en-GB" sz="1200" i="1" dirty="0"/>
+              <a:t> la </a:t>
+            </a:r>
+            <a:r>
+              <a:rPr lang="en-GB" sz="1200" i="1" dirty="0" err="1"/>
+              <a:t>clase</a:t>
+            </a:r>
+            <a:r>
+              <a:rPr lang="en-GB" sz="1200" i="1" dirty="0"/>
+              <a:t> positive, </a:t>
+            </a:r>
+            <a:r>
+              <a:rPr lang="en-GB" sz="1200" i="1" dirty="0" err="1"/>
+              <a:t>indicando</a:t>
+            </a:r>
+            <a:r>
+              <a:rPr lang="en-GB" sz="1200" i="1" dirty="0"/>
+              <a:t> </a:t>
+            </a:r>
+            <a:r>
+              <a:rPr lang="en-GB" sz="1200" i="1" dirty="0" err="1"/>
+              <a:t>que</a:t>
+            </a:r>
+            <a:r>
+              <a:rPr lang="en-GB" sz="1200" i="1" dirty="0"/>
+              <a:t> para </a:t>
+            </a:r>
+            <a:r>
+              <a:rPr lang="en-GB" sz="1200" i="1" dirty="0" err="1"/>
+              <a:t>nuestro</a:t>
+            </a:r>
+            <a:r>
+              <a:rPr lang="en-GB" sz="1200" i="1" dirty="0"/>
+              <a:t> </a:t>
+            </a:r>
+            <a:r>
+              <a:rPr lang="en-GB" sz="1200" i="1" dirty="0" err="1"/>
+              <a:t>trabajo</a:t>
+            </a:r>
+            <a:r>
+              <a:rPr lang="en-GB" sz="1200" i="1" dirty="0"/>
+              <a:t> no es tan </a:t>
+            </a:r>
+            <a:r>
+              <a:rPr lang="en-GB" sz="1200" i="1" dirty="0" err="1"/>
+              <a:t>útil</a:t>
+            </a:r>
+            <a:r>
+              <a:rPr lang="en-GB" sz="1200" i="1" dirty="0"/>
+              <a:t>. </a:t>
+            </a:r>
+          </a:p>
+          <a:p>
+            <a:r>
+              <a:rPr lang="en-GB" sz="1200" i="1" dirty="0"/>
+              <a:t>Al ser </a:t>
+            </a:r>
+            <a:r>
+              <a:rPr lang="en-GB" sz="1200" i="1" dirty="0" err="1"/>
+              <a:t>datos</a:t>
+            </a:r>
+            <a:r>
+              <a:rPr lang="en-GB" sz="1200" i="1" dirty="0"/>
+              <a:t> </a:t>
+            </a:r>
+            <a:r>
+              <a:rPr lang="en-GB" sz="1200" i="1" dirty="0" err="1"/>
+              <a:t>desbalancedos</a:t>
+            </a:r>
+            <a:r>
+              <a:rPr lang="en-GB" sz="1200" i="1" dirty="0"/>
+              <a:t>. El accuracy no da </a:t>
+            </a:r>
+            <a:r>
+              <a:rPr lang="en-GB" sz="1200" i="1" dirty="0" err="1"/>
+              <a:t>una</a:t>
+            </a:r>
+            <a:r>
+              <a:rPr lang="en-GB" sz="1200" i="1" dirty="0"/>
+              <a:t> </a:t>
+            </a:r>
+            <a:r>
+              <a:rPr lang="en-GB" sz="1200" i="1" dirty="0" err="1"/>
+              <a:t>métrica</a:t>
+            </a:r>
+            <a:r>
+              <a:rPr lang="en-GB" sz="1200" i="1" dirty="0"/>
+              <a:t> </a:t>
+            </a:r>
+            <a:r>
+              <a:rPr lang="en-GB" sz="1200" i="1" dirty="0" err="1"/>
+              <a:t>correcta</a:t>
+            </a:r>
+            <a:r>
+              <a:rPr lang="en-GB" sz="1200" i="1" dirty="0"/>
+              <a:t> o </a:t>
+            </a:r>
+            <a:r>
+              <a:rPr lang="en-GB" sz="1200" i="1" dirty="0" err="1"/>
+              <a:t>creïble</a:t>
+            </a:r>
+            <a:r>
+              <a:rPr lang="en-GB" sz="1200" i="1" dirty="0"/>
+              <a:t>. </a:t>
+            </a:r>
+          </a:p>
+          <a:p>
+            <a:pPr lvl="5"/>
             <a:r>
               <a:rPr lang="es-ES" sz="1200" i="1" dirty="0"/>
-              <a:t>(Ver “Registros </a:t>
+              <a:t>(Ver todas las modelizaciones realizadas en “Registros </a:t>
             </a:r>
             <a:r>
               <a:rPr lang="es-ES" sz="1200" i="1" dirty="0" err="1"/>
@@ -20289,7 +20593,7 @@
               <a:t>” evaluados en </a:t>
             </a:r>
             <a:r>
-              <a:rPr lang="es-ES" sz="1200" i="1" dirty="0" err="1">
+              <a:rPr lang="es-ES" sz="1200" i="1" dirty="0">
                 <a:hlinkClick r:id="rId3"/>
               </a:rPr>
               <a:t>Github</a:t>
@@ -20309,8 +20613,8 @@
           <p:nvPr/>
         </p:nvSpPr>
         <p:spPr>
-          <a:xfrm rot="1074322">
-            <a:off x="7029763" y="2272572"/>
+          <a:xfrm>
+            <a:off x="7050491" y="1944838"/>
             <a:ext cx="1840101" cy="673582"/>
           </a:xfrm>
           <a:prstGeom prst="leftArrow">
@@ -20367,77 +20671,6 @@
                 </a:solidFill>
               </a:rPr>
               <a:t> F1&lt;0,5</a:t>
-            </a:r>
-          </a:p>
-        </p:txBody>
-      </p:sp>
-      <p:sp>
-        <p:nvSpPr>
-          <p:cNvPr id="18" name="Flecha: hacia la izquierda 8"/>
-          <p:cNvSpPr/>
-          <p:nvPr/>
-        </p:nvSpPr>
-        <p:spPr>
-          <a:xfrm rot="21098126">
-            <a:off x="7059022" y="960890"/>
-            <a:ext cx="1411605" cy="401695"/>
-          </a:xfrm>
-          <a:prstGeom prst="leftArrow">
-            <a:avLst/>
-          </a:prstGeom>
-        </p:spPr>
-        <p:style>
-          <a:lnRef idx="2">
-            <a:schemeClr val="accent1">
-              <a:shade val="15000"/>
-            </a:schemeClr>
-          </a:lnRef>
-          <a:fillRef idx="1">
-            <a:schemeClr val="accent1"/>
-          </a:fillRef>
-          <a:effectRef idx="0">
-            <a:schemeClr val="accent1"/>
-          </a:effectRef>
-          <a:fontRef idx="minor">
-            <a:schemeClr val="lt1"/>
-          </a:fontRef>
-        </p:style>
-        <p:txBody>
-          <a:bodyPr rtlCol="0" anchor="ctr"/>
-          <a:lstStyle/>
-          <a:p>
-            <a:pPr algn="ctr"/>
-            <a:r>
-              <a:rPr lang="en-US" altLang="ca-ES" sz="1200" dirty="0">
-                <a:solidFill>
-                  <a:schemeClr val="tx1"/>
-                </a:solidFill>
-              </a:rPr>
-              <a:t>O</a:t>
-            </a:r>
-            <a:r>
-              <a:rPr lang="ca-ES" sz="1200" dirty="0" err="1">
-                <a:solidFill>
-                  <a:schemeClr val="tx1"/>
-                </a:solidFill>
-              </a:rPr>
-              <a:t>v</a:t>
-            </a:r>
-            <a:r>
-              <a:rPr lang="en-US" altLang="ca-ES" sz="1200" dirty="0" err="1">
-                <a:solidFill>
-                  <a:schemeClr val="tx1"/>
-                </a:solidFill>
-              </a:rPr>
-              <a:t>e</a:t>
-            </a:r>
-            <a:r>
-              <a:rPr lang="ca-ES" sz="1200" dirty="0" err="1">
-                <a:solidFill>
-                  <a:schemeClr val="tx1"/>
-                </a:solidFill>
-              </a:rPr>
-              <a:t>rfitting</a:t>
             </a:r>
           </a:p>
         </p:txBody>
@@ -20512,7 +20745,7 @@
         </p:nvSpPr>
         <p:spPr>
           <a:xfrm>
-            <a:off x="7033969" y="1614741"/>
+            <a:off x="7012237" y="1156497"/>
             <a:ext cx="1916610" cy="453829"/>
           </a:xfrm>
           <a:prstGeom prst="leftArrow">
@@ -20619,114 +20852,6 @@
           </a:p>
         </p:txBody>
       </p:sp>
-      <p:pic>
-        <p:nvPicPr>
-          <p:cNvPr id="2" name="Picture 1">
-            <a:extLst>
-              <a:ext uri="{FF2B5EF4-FFF2-40B4-BE49-F238E27FC236}">
-                <a16:creationId xmlns:a16="http://schemas.microsoft.com/office/drawing/2014/main" id="{633856C8-457E-85C9-545D-9133F826B174}"/>
-              </a:ext>
-            </a:extLst>
-          </p:cNvPr>
-          <p:cNvPicPr>
-            <a:picLocks noChangeAspect="1"/>
-          </p:cNvPicPr>
-          <p:nvPr/>
-        </p:nvPicPr>
-        <p:blipFill>
-          <a:blip r:embed="rId3"/>
-          <a:stretch>
-            <a:fillRect/>
-          </a:stretch>
-        </p:blipFill>
-        <p:spPr>
-          <a:xfrm>
-            <a:off x="1625700" y="1115036"/>
-            <a:ext cx="5562600" cy="2356013"/>
-          </a:xfrm>
-          <a:prstGeom prst="rect">
-            <a:avLst/>
-          </a:prstGeom>
-        </p:spPr>
-      </p:pic>
-      <p:sp>
-        <p:nvSpPr>
-          <p:cNvPr id="3" name="TextBox 2">
-            <a:extLst>
-              <a:ext uri="{FF2B5EF4-FFF2-40B4-BE49-F238E27FC236}">
-                <a16:creationId xmlns:a16="http://schemas.microsoft.com/office/drawing/2014/main" id="{CBB543AC-28C6-CB87-2130-192D13526D85}"/>
-              </a:ext>
-            </a:extLst>
-          </p:cNvPr>
-          <p:cNvSpPr txBox="1"/>
-          <p:nvPr/>
-        </p:nvSpPr>
-        <p:spPr>
-          <a:xfrm>
-            <a:off x="2687220" y="1150060"/>
-            <a:ext cx="564578" cy="307777"/>
-          </a:xfrm>
-          <a:prstGeom prst="rect">
-            <a:avLst/>
-          </a:prstGeom>
-          <a:noFill/>
-        </p:spPr>
-        <p:txBody>
-          <a:bodyPr wrap="none" rtlCol="0">
-            <a:spAutoFit/>
-          </a:bodyPr>
-          <a:lstStyle/>
-          <a:p>
-            <a:r>
-              <a:rPr lang="en-ES" dirty="0"/>
-              <a:t>KNN</a:t>
-            </a:r>
-          </a:p>
-        </p:txBody>
-      </p:sp>
-      <p:sp>
-        <p:nvSpPr>
-          <p:cNvPr id="5" name="TextBox 4">
-            <a:extLst>
-              <a:ext uri="{FF2B5EF4-FFF2-40B4-BE49-F238E27FC236}">
-                <a16:creationId xmlns:a16="http://schemas.microsoft.com/office/drawing/2014/main" id="{1B72F570-8C4E-D03D-19B6-735E5B05BD2C}"/>
-              </a:ext>
-            </a:extLst>
-          </p:cNvPr>
-          <p:cNvSpPr txBox="1"/>
-          <p:nvPr/>
-        </p:nvSpPr>
-        <p:spPr>
-          <a:xfrm>
-            <a:off x="5291719" y="1111741"/>
-            <a:ext cx="1200970" cy="307777"/>
-          </a:xfrm>
-          <a:prstGeom prst="rect">
-            <a:avLst/>
-          </a:prstGeom>
-          <a:noFill/>
-        </p:spPr>
-        <p:txBody>
-          <a:bodyPr wrap="none" rtlCol="0">
-            <a:spAutoFit/>
-          </a:bodyPr>
-          <a:lstStyle/>
-          <a:p>
-            <a:r>
-              <a:rPr lang="en-ES" dirty="0"/>
-              <a:t>Na</a:t>
-            </a:r>
-            <a:r>
-              <a:rPr lang="en-GB" dirty="0" err="1"/>
-              <a:t>ï</a:t>
-            </a:r>
-            <a:r>
-              <a:rPr lang="en-ES" dirty="0"/>
-              <a:t>ve Bayes</a:t>
-            </a:r>
-          </a:p>
-        </p:txBody>
-      </p:sp>
       <p:sp>
         <p:nvSpPr>
           <p:cNvPr id="7" name="TextBox 6">
@@ -20741,7 +20866,7 @@
         </p:nvSpPr>
         <p:spPr>
           <a:xfrm>
-            <a:off x="2410265" y="3474344"/>
+            <a:off x="373250" y="1368174"/>
             <a:ext cx="3538148" cy="307777"/>
           </a:xfrm>
           <a:prstGeom prst="rect">
@@ -20780,8 +20905,8 @@
         </p:nvSpPr>
         <p:spPr>
           <a:xfrm>
-            <a:off x="80300" y="3782121"/>
-            <a:ext cx="9063700" cy="1154162"/>
+            <a:off x="126276" y="1828689"/>
+            <a:ext cx="4198298" cy="2554545"/>
           </a:xfrm>
           <a:prstGeom prst="rect">
             <a:avLst/>
@@ -20789,446 +20914,554 @@
           <a:noFill/>
         </p:spPr>
         <p:txBody>
-          <a:bodyPr wrap="none" rtlCol="0">
+          <a:bodyPr wrap="square" rtlCol="0">
             <a:spAutoFit/>
           </a:bodyPr>
           <a:lstStyle/>
           <a:p>
-            <a:pPr marL="171450" indent="-171450">
+            <a:pPr marL="171450" indent="-171450" algn="just">
               <a:buFont typeface="Arial" panose="020B0604020202020204" pitchFamily="34" charset="0"/>
               <a:buChar char="•"/>
             </a:pPr>
             <a:r>
-              <a:rPr lang="en-GB" sz="1100" dirty="0"/>
+              <a:rPr lang="en-GB" sz="1200" dirty="0"/>
               <a:t>Los </a:t>
             </a:r>
             <a:r>
-              <a:rPr lang="en-GB" sz="1100" dirty="0" err="1"/>
+              <a:rPr lang="en-GB" sz="1200" dirty="0" err="1"/>
               <a:t>modelos</a:t>
             </a:r>
             <a:r>
-              <a:rPr lang="en-GB" sz="1100" dirty="0"/>
+              <a:rPr lang="en-GB" sz="1200" dirty="0"/>
               <a:t> </a:t>
             </a:r>
             <a:r>
-              <a:rPr lang="en-GB" sz="1100" dirty="0" err="1"/>
+              <a:rPr lang="en-GB" sz="1200" dirty="0" err="1"/>
               <a:t>iniciales</a:t>
             </a:r>
             <a:r>
-              <a:rPr lang="en-GB" sz="1100" dirty="0"/>
+              <a:rPr lang="en-GB" sz="1200" dirty="0"/>
               <a:t> (</a:t>
             </a:r>
             <a:r>
-              <a:rPr lang="en-GB" sz="1100" b="1" dirty="0"/>
+              <a:rPr lang="en-GB" sz="1200" b="1" dirty="0"/>
               <a:t>KNN</a:t>
             </a:r>
             <a:r>
-              <a:rPr lang="en-GB" sz="1100" dirty="0"/>
+              <a:rPr lang="en-GB" sz="1200" dirty="0"/>
               <a:t> y </a:t>
             </a:r>
             <a:r>
-              <a:rPr lang="en-GB" sz="1100" b="1" dirty="0"/>
+              <a:rPr lang="en-GB" sz="1200" b="1" dirty="0"/>
               <a:t>Naive Bayes</a:t>
             </a:r>
             <a:r>
-              <a:rPr lang="en-GB" sz="1100" dirty="0"/>
+              <a:rPr lang="en-GB" sz="1200" dirty="0"/>
               <a:t>) </a:t>
             </a:r>
             <a:r>
-              <a:rPr lang="en-GB" sz="1100" dirty="0" err="1"/>
+              <a:rPr lang="en-GB" sz="1200" dirty="0" err="1"/>
               <a:t>mostraron</a:t>
             </a:r>
             <a:r>
-              <a:rPr lang="en-GB" sz="1100" dirty="0"/>
+              <a:rPr lang="en-GB" sz="1200" dirty="0"/>
               <a:t> </a:t>
             </a:r>
             <a:r>
-              <a:rPr lang="en-GB" sz="1100" b="1" dirty="0"/>
+              <a:rPr lang="en-GB" sz="1200" b="1" dirty="0"/>
               <a:t>bajo </a:t>
             </a:r>
             <a:r>
-              <a:rPr lang="en-GB" sz="1100" b="1" dirty="0" err="1"/>
+              <a:rPr lang="en-GB" sz="1200" b="1" dirty="0" err="1"/>
               <a:t>desempeño</a:t>
             </a:r>
             <a:r>
-              <a:rPr lang="en-GB" sz="1100" b="1" dirty="0"/>
+              <a:rPr lang="en-GB" sz="1200" b="1" dirty="0"/>
               <a:t> </a:t>
             </a:r>
             <a:r>
-              <a:rPr lang="en-GB" sz="1100" b="1" dirty="0" err="1"/>
+              <a:rPr lang="en-GB" sz="1200" b="1" dirty="0" err="1"/>
               <a:t>predictivo</a:t>
             </a:r>
             <a:r>
-              <a:rPr lang="en-GB" sz="1100" dirty="0"/>
+              <a:rPr lang="en-GB" sz="1200" dirty="0"/>
               <a:t> </a:t>
             </a:r>
             <a:r>
-              <a:rPr lang="en-GB" sz="1100" dirty="0" err="1"/>
+              <a:rPr lang="en-GB" sz="1200" dirty="0" err="1"/>
               <a:t>en</a:t>
             </a:r>
             <a:r>
-              <a:rPr lang="en-GB" sz="1100" dirty="0"/>
+              <a:rPr lang="en-GB" sz="1200" dirty="0"/>
               <a:t> la </a:t>
             </a:r>
             <a:r>
-              <a:rPr lang="en-GB" sz="1100" dirty="0" err="1"/>
+              <a:rPr lang="en-GB" sz="1200" dirty="0" err="1"/>
               <a:t>detección</a:t>
             </a:r>
             <a:r>
-              <a:rPr lang="en-GB" sz="1100" dirty="0"/>
+              <a:rPr lang="en-GB" sz="1200" dirty="0"/>
               <a:t> de </a:t>
             </a:r>
             <a:r>
-              <a:rPr lang="en-GB" sz="1100" dirty="0" err="1"/>
+              <a:rPr lang="en-GB" sz="1200" dirty="0" err="1"/>
               <a:t>clientes</a:t>
             </a:r>
             <a:r>
-              <a:rPr lang="en-GB" sz="1100" dirty="0"/>
+              <a:rPr lang="en-GB" sz="1200" dirty="0"/>
               <a:t> con </a:t>
             </a:r>
             <a:r>
-              <a:rPr lang="en-GB" sz="1100" dirty="0" err="1"/>
+              <a:rPr lang="en-GB" sz="1200" dirty="0" err="1"/>
               <a:t>riesgo</a:t>
             </a:r>
             <a:r>
-              <a:rPr lang="en-GB" sz="1100" dirty="0"/>
+              <a:rPr lang="en-GB" sz="1200" dirty="0"/>
               <a:t> de </a:t>
             </a:r>
             <a:r>
-              <a:rPr lang="en-GB" sz="1100" i="1" dirty="0"/>
+              <a:rPr lang="en-GB" sz="1200" i="1" dirty="0"/>
               <a:t>churn</a:t>
             </a:r>
             <a:r>
-              <a:rPr lang="en-GB" sz="1100" dirty="0"/>
+              <a:rPr lang="en-GB" sz="1200" dirty="0"/>
               <a:t>.</a:t>
             </a:r>
           </a:p>
           <a:p>
-            <a:pPr marL="171450" indent="-171450">
+            <a:pPr marL="171450" indent="-171450" algn="just">
               <a:buFont typeface="Arial" panose="020B0604020202020204" pitchFamily="34" charset="0"/>
               <a:buChar char="•"/>
             </a:pPr>
             <a:r>
-              <a:rPr lang="en-GB" sz="1100" dirty="0"/>
+              <a:rPr lang="en-GB" sz="1200" dirty="0"/>
               <a:t>Se </a:t>
             </a:r>
             <a:r>
-              <a:rPr lang="en-GB" sz="1100" dirty="0" err="1"/>
+              <a:rPr lang="en-GB" sz="1200" dirty="0" err="1"/>
               <a:t>concluye</a:t>
             </a:r>
             <a:r>
-              <a:rPr lang="en-GB" sz="1100" dirty="0"/>
+              <a:rPr lang="en-GB" sz="1200" dirty="0"/>
               <a:t> que </a:t>
             </a:r>
             <a:r>
-              <a:rPr lang="en-GB" sz="1100" b="1" dirty="0" err="1"/>
+              <a:rPr lang="en-GB" sz="1200" b="1" dirty="0" err="1"/>
               <a:t>estas</a:t>
             </a:r>
             <a:r>
-              <a:rPr lang="en-GB" sz="1100" b="1" dirty="0"/>
+              <a:rPr lang="en-GB" sz="1200" b="1" dirty="0"/>
               <a:t> </a:t>
             </a:r>
             <a:r>
-              <a:rPr lang="en-GB" sz="1100" b="1" dirty="0" err="1"/>
+              <a:rPr lang="en-GB" sz="1200" b="1" dirty="0" err="1"/>
               <a:t>técnicas</a:t>
             </a:r>
             <a:r>
-              <a:rPr lang="en-GB" sz="1100" b="1" dirty="0"/>
+              <a:rPr lang="en-GB" sz="1200" b="1" dirty="0"/>
               <a:t> no son las </a:t>
             </a:r>
             <a:r>
-              <a:rPr lang="en-GB" sz="1100" b="1" dirty="0" err="1"/>
+              <a:rPr lang="en-GB" sz="1200" b="1" dirty="0" err="1"/>
               <a:t>más</a:t>
             </a:r>
             <a:r>
-              <a:rPr lang="en-GB" sz="1100" b="1" dirty="0"/>
+              <a:rPr lang="en-GB" sz="1200" b="1" dirty="0"/>
               <a:t> </a:t>
             </a:r>
             <a:r>
-              <a:rPr lang="en-GB" sz="1100" b="1" dirty="0" err="1"/>
+              <a:rPr lang="en-GB" sz="1200" b="1" dirty="0" err="1"/>
               <a:t>adecuadas</a:t>
             </a:r>
             <a:r>
-              <a:rPr lang="en-GB" sz="1100" dirty="0"/>
+              <a:rPr lang="en-GB" sz="1200" dirty="0"/>
               <a:t> para </a:t>
             </a:r>
             <a:r>
-              <a:rPr lang="en-GB" sz="1100" dirty="0" err="1"/>
+              <a:rPr lang="en-GB" sz="1200" dirty="0" err="1"/>
               <a:t>capturar</a:t>
             </a:r>
             <a:r>
-              <a:rPr lang="en-GB" sz="1100" dirty="0"/>
+              <a:rPr lang="en-GB" sz="1200" dirty="0"/>
               <a:t> </a:t>
             </a:r>
             <a:r>
-              <a:rPr lang="en-GB" sz="1100" dirty="0" err="1"/>
+              <a:rPr lang="en-GB" sz="1200" dirty="0" err="1"/>
               <a:t>los</a:t>
             </a:r>
             <a:r>
-              <a:rPr lang="en-GB" sz="1100" dirty="0"/>
+              <a:rPr lang="en-GB" sz="1200" dirty="0"/>
               <a:t> </a:t>
             </a:r>
             <a:r>
-              <a:rPr lang="en-GB" sz="1100" dirty="0" err="1"/>
+              <a:rPr lang="en-GB" sz="1200" dirty="0" err="1"/>
               <a:t>patrones</a:t>
             </a:r>
             <a:r>
-              <a:rPr lang="en-GB" sz="1100" dirty="0"/>
+              <a:rPr lang="en-GB" sz="1200" dirty="0"/>
               <a:t> de </a:t>
             </a:r>
             <a:r>
-              <a:rPr lang="en-GB" sz="1100" dirty="0" err="1"/>
+              <a:rPr lang="en-GB" sz="1200" dirty="0" err="1"/>
               <a:t>abandono</a:t>
             </a:r>
             <a:r>
-              <a:rPr lang="en-GB" sz="1100" dirty="0"/>
+              <a:rPr lang="en-GB" sz="1200" dirty="0"/>
               <a:t> </a:t>
             </a:r>
             <a:r>
-              <a:rPr lang="en-GB" sz="1100" dirty="0" err="1"/>
+              <a:rPr lang="en-GB" sz="1200" dirty="0" err="1"/>
               <a:t>en</a:t>
             </a:r>
             <a:r>
-              <a:rPr lang="en-GB" sz="1100" dirty="0"/>
+              <a:rPr lang="en-GB" sz="1200" dirty="0"/>
               <a:t> </a:t>
             </a:r>
             <a:r>
-              <a:rPr lang="en-GB" sz="1100" dirty="0" err="1"/>
+              <a:rPr lang="en-GB" sz="1200" dirty="0" err="1"/>
               <a:t>los</a:t>
             </a:r>
             <a:r>
-              <a:rPr lang="en-GB" sz="1100" dirty="0"/>
+              <a:rPr lang="en-GB" sz="1200" dirty="0"/>
               <a:t> </a:t>
             </a:r>
             <a:r>
-              <a:rPr lang="en-GB" sz="1100" dirty="0" err="1"/>
+              <a:rPr lang="en-GB" sz="1200" dirty="0" err="1"/>
               <a:t>datos</a:t>
             </a:r>
             <a:r>
-              <a:rPr lang="en-GB" sz="1100" dirty="0"/>
+              <a:rPr lang="en-GB" sz="1200" dirty="0"/>
               <a:t>.</a:t>
             </a:r>
           </a:p>
           <a:p>
-            <a:pPr marL="171450" indent="-171450">
+            <a:pPr marL="171450" indent="-171450" algn="just">
               <a:buFont typeface="Arial" panose="020B0604020202020204" pitchFamily="34" charset="0"/>
               <a:buChar char="•"/>
             </a:pPr>
             <a:r>
-              <a:rPr lang="en-GB" sz="1100" dirty="0"/>
+              <a:rPr lang="en-GB" sz="1200" dirty="0"/>
               <a:t>Como </a:t>
             </a:r>
             <a:r>
-              <a:rPr lang="en-GB" sz="1100" dirty="0" err="1"/>
+              <a:rPr lang="en-GB" sz="1200" dirty="0" err="1"/>
               <a:t>siguiente</a:t>
             </a:r>
             <a:r>
-              <a:rPr lang="en-GB" sz="1100" dirty="0"/>
+              <a:rPr lang="en-GB" sz="1200" dirty="0"/>
               <a:t> paso, se </a:t>
             </a:r>
             <a:r>
-              <a:rPr lang="en-GB" sz="1100" dirty="0" err="1"/>
+              <a:rPr lang="en-GB" sz="1200" dirty="0" err="1"/>
               <a:t>propone</a:t>
             </a:r>
             <a:r>
-              <a:rPr lang="en-GB" sz="1100" dirty="0"/>
+              <a:rPr lang="en-GB" sz="1200" dirty="0"/>
               <a:t> </a:t>
             </a:r>
             <a:r>
-              <a:rPr lang="en-GB" sz="1100" dirty="0" err="1"/>
+              <a:rPr lang="en-GB" sz="1200" dirty="0" err="1"/>
               <a:t>implementar</a:t>
             </a:r>
             <a:r>
-              <a:rPr lang="en-GB" sz="1100" dirty="0"/>
+              <a:rPr lang="en-GB" sz="1200" dirty="0"/>
               <a:t> un </a:t>
             </a:r>
             <a:r>
-              <a:rPr lang="en-GB" sz="1100" b="1" dirty="0"/>
+              <a:rPr lang="en-GB" sz="1200" b="1" dirty="0"/>
               <a:t>árbol de </a:t>
             </a:r>
             <a:r>
-              <a:rPr lang="en-GB" sz="1100" b="1" dirty="0" err="1"/>
+              <a:rPr lang="en-GB" sz="1200" b="1" dirty="0" err="1"/>
               <a:t>decisión</a:t>
             </a:r>
             <a:r>
-              <a:rPr lang="en-GB" sz="1100" dirty="0"/>
+              <a:rPr lang="en-GB" sz="1200" dirty="0"/>
               <a:t> y </a:t>
             </a:r>
             <a:r>
-              <a:rPr lang="en-GB" sz="1100" dirty="0" err="1"/>
+              <a:rPr lang="en-GB" sz="1200" dirty="0" err="1"/>
               <a:t>evaluar</a:t>
             </a:r>
             <a:r>
-              <a:rPr lang="en-GB" sz="1100" dirty="0"/>
+              <a:rPr lang="en-GB" sz="1200" dirty="0"/>
               <a:t> </a:t>
             </a:r>
             <a:r>
-              <a:rPr lang="en-GB" sz="1100" b="1" dirty="0" err="1"/>
+              <a:rPr lang="en-GB" sz="1200" b="1" dirty="0" err="1"/>
               <a:t>otros</a:t>
             </a:r>
             <a:r>
-              <a:rPr lang="en-GB" sz="1100" b="1" dirty="0"/>
+              <a:rPr lang="en-GB" sz="1200" b="1" dirty="0"/>
               <a:t> </a:t>
             </a:r>
             <a:r>
-              <a:rPr lang="en-GB" sz="1100" b="1" dirty="0" err="1"/>
+              <a:rPr lang="en-GB" sz="1200" b="1" dirty="0" err="1"/>
               <a:t>algoritmos</a:t>
             </a:r>
             <a:r>
-              <a:rPr lang="en-GB" sz="1100" b="1" dirty="0"/>
+              <a:rPr lang="en-GB" sz="1200" b="1" dirty="0"/>
               <a:t> alternativos</a:t>
             </a:r>
             <a:r>
-              <a:rPr lang="en-GB" sz="1100" dirty="0"/>
+              <a:rPr lang="en-GB" sz="1200" dirty="0"/>
               <a:t> para </a:t>
             </a:r>
             <a:r>
-              <a:rPr lang="en-GB" sz="1100" dirty="0" err="1"/>
+              <a:rPr lang="en-GB" sz="1200" dirty="0" err="1"/>
               <a:t>optimizar</a:t>
             </a:r>
             <a:r>
-              <a:rPr lang="en-GB" sz="1100" dirty="0"/>
+              <a:rPr lang="en-GB" sz="1200" dirty="0"/>
               <a:t> la </a:t>
             </a:r>
             <a:r>
-              <a:rPr lang="en-GB" sz="1100" dirty="0" err="1"/>
+              <a:rPr lang="en-GB" sz="1200" dirty="0" err="1"/>
               <a:t>predicción</a:t>
             </a:r>
             <a:r>
-              <a:rPr lang="en-GB" sz="1100" dirty="0"/>
+              <a:rPr lang="en-GB" sz="1200" dirty="0"/>
               <a:t>.</a:t>
             </a:r>
           </a:p>
           <a:p>
-            <a:pPr marL="171450" indent="-171450">
+            <a:pPr marL="171450" indent="-171450" algn="just">
               <a:buFont typeface="Arial" panose="020B0604020202020204" pitchFamily="34" charset="0"/>
               <a:buChar char="•"/>
             </a:pPr>
             <a:r>
-              <a:rPr lang="en-GB" sz="1100" b="1" dirty="0" err="1"/>
+              <a:rPr lang="en-GB" sz="1200" b="1" dirty="0" err="1"/>
               <a:t>Mensaje</a:t>
             </a:r>
             <a:r>
-              <a:rPr lang="en-GB" sz="1100" b="1" dirty="0"/>
+              <a:rPr lang="en-GB" sz="1200" b="1" dirty="0"/>
               <a:t> para </a:t>
             </a:r>
             <a:r>
-              <a:rPr lang="en-GB" sz="1100" b="1" dirty="0" err="1"/>
+              <a:rPr lang="en-GB" sz="1200" b="1" dirty="0" err="1"/>
               <a:t>los</a:t>
             </a:r>
             <a:r>
-              <a:rPr lang="en-GB" sz="1100" b="1" dirty="0"/>
+              <a:rPr lang="en-GB" sz="1200" b="1" dirty="0"/>
               <a:t> stakeholders:</a:t>
             </a:r>
             <a:r>
-              <a:rPr lang="en-GB" sz="1100" dirty="0"/>
+              <a:rPr lang="en-GB" sz="1200" dirty="0"/>
               <a:t> </a:t>
             </a:r>
             <a:r>
-              <a:rPr lang="en-GB" sz="1100" dirty="0" err="1"/>
+              <a:rPr lang="en-GB" sz="1200" dirty="0" err="1"/>
               <a:t>mejorar</a:t>
             </a:r>
             <a:r>
-              <a:rPr lang="en-GB" sz="1100" dirty="0"/>
+              <a:rPr lang="en-GB" sz="1200" dirty="0"/>
               <a:t> la </a:t>
             </a:r>
             <a:r>
-              <a:rPr lang="en-GB" sz="1100" dirty="0" err="1"/>
+              <a:rPr lang="en-GB" sz="1200" dirty="0" err="1"/>
               <a:t>capacidad</a:t>
             </a:r>
             <a:r>
-              <a:rPr lang="en-GB" sz="1100" dirty="0"/>
+              <a:rPr lang="en-GB" sz="1200" dirty="0"/>
               <a:t> </a:t>
             </a:r>
             <a:r>
-              <a:rPr lang="en-GB" sz="1100" dirty="0" err="1"/>
+              <a:rPr lang="en-GB" sz="1200" dirty="0" err="1"/>
               <a:t>predictiva</a:t>
             </a:r>
             <a:r>
-              <a:rPr lang="en-GB" sz="1100" dirty="0"/>
+              <a:rPr lang="en-GB" sz="1200" dirty="0"/>
               <a:t> </a:t>
             </a:r>
             <a:r>
-              <a:rPr lang="en-GB" sz="1100" dirty="0" err="1"/>
+              <a:rPr lang="en-GB" sz="1200" dirty="0" err="1"/>
               <a:t>permitirá</a:t>
             </a:r>
             <a:r>
-              <a:rPr lang="en-GB" sz="1100" dirty="0"/>
+              <a:rPr lang="en-GB" sz="1200" dirty="0"/>
               <a:t> </a:t>
             </a:r>
             <a:r>
-              <a:rPr lang="en-GB" sz="1100" b="1" dirty="0" err="1"/>
+              <a:rPr lang="en-GB" sz="1200" b="1" dirty="0" err="1"/>
               <a:t>anticipar</a:t>
             </a:r>
             <a:r>
-              <a:rPr lang="en-GB" sz="1100" b="1" dirty="0"/>
+              <a:rPr lang="en-GB" sz="1200" b="1" dirty="0"/>
               <a:t> </a:t>
             </a:r>
             <a:r>
-              <a:rPr lang="en-GB" sz="1100" b="1" dirty="0" err="1"/>
+              <a:rPr lang="en-GB" sz="1200" b="1" dirty="0" err="1"/>
               <a:t>el</a:t>
             </a:r>
             <a:r>
-              <a:rPr lang="en-GB" sz="1100" b="1" dirty="0"/>
+              <a:rPr lang="en-GB" sz="1200" b="1" dirty="0"/>
               <a:t> </a:t>
             </a:r>
             <a:r>
-              <a:rPr lang="en-GB" sz="1100" b="1" dirty="0" err="1"/>
+              <a:rPr lang="en-GB" sz="1200" b="1" dirty="0" err="1"/>
               <a:t>abandono</a:t>
             </a:r>
             <a:r>
-              <a:rPr lang="en-GB" sz="1100" b="1" dirty="0"/>
+              <a:rPr lang="en-GB" sz="1200" b="1" dirty="0"/>
               <a:t> de </a:t>
             </a:r>
             <a:r>
-              <a:rPr lang="en-GB" sz="1100" b="1" dirty="0" err="1"/>
+              <a:rPr lang="en-GB" sz="1200" b="1" dirty="0" err="1"/>
               <a:t>clientes</a:t>
             </a:r>
             <a:r>
-              <a:rPr lang="en-GB" sz="1100" dirty="0"/>
+              <a:rPr lang="en-GB" sz="1200" dirty="0"/>
               <a:t> y </a:t>
             </a:r>
             <a:r>
-              <a:rPr lang="en-GB" sz="1100" b="1" dirty="0" err="1"/>
+              <a:rPr lang="en-GB" sz="1200" b="1" dirty="0" err="1"/>
               <a:t>diseñar</a:t>
             </a:r>
-            <a:endParaRPr lang="en-GB" sz="1100" b="1" dirty="0"/>
+            <a:r>
+              <a:rPr lang="en-GB" sz="1200" b="1" dirty="0"/>
+              <a:t> </a:t>
+            </a:r>
+            <a:r>
+              <a:rPr lang="en-GB" sz="1200" b="1" dirty="0" err="1"/>
+              <a:t>estrategias</a:t>
+            </a:r>
+            <a:r>
+              <a:rPr lang="en-GB" sz="1200" b="1" dirty="0"/>
+              <a:t> </a:t>
+            </a:r>
+            <a:r>
+              <a:rPr lang="en-GB" sz="1200" b="1" dirty="0" err="1"/>
+              <a:t>proactivas</a:t>
+            </a:r>
+            <a:r>
+              <a:rPr lang="en-GB" sz="1200" b="1" dirty="0"/>
+              <a:t> de </a:t>
+            </a:r>
+            <a:r>
+              <a:rPr lang="en-GB" sz="1200" b="1" dirty="0" err="1"/>
+              <a:t>retención</a:t>
+            </a:r>
+            <a:r>
+              <a:rPr lang="en-GB" sz="1200" dirty="0"/>
+              <a:t>.</a:t>
+            </a:r>
           </a:p>
           <a:p>
-            <a:r>
-              <a:rPr lang="en-GB" sz="1100" b="1" dirty="0"/>
-              <a:t>     </a:t>
-            </a:r>
-            <a:r>
-              <a:rPr lang="en-GB" sz="1100" b="1" dirty="0" err="1"/>
-              <a:t>estrategias</a:t>
-            </a:r>
-            <a:r>
-              <a:rPr lang="en-GB" sz="1100" b="1" dirty="0"/>
-              <a:t> </a:t>
-            </a:r>
-            <a:r>
-              <a:rPr lang="en-GB" sz="1100" b="1" dirty="0" err="1"/>
-              <a:t>proactivas</a:t>
-            </a:r>
-            <a:r>
-              <a:rPr lang="en-GB" sz="1100" b="1" dirty="0"/>
-              <a:t> de </a:t>
-            </a:r>
-            <a:r>
-              <a:rPr lang="en-GB" sz="1100" b="1" dirty="0" err="1"/>
-              <a:t>retención</a:t>
-            </a:r>
-            <a:r>
-              <a:rPr lang="en-GB" sz="1100" dirty="0"/>
-              <a:t>.</a:t>
-            </a:r>
-          </a:p>
-          <a:p>
-            <a:endParaRPr lang="en-ES" dirty="0"/>
+            <a:pPr algn="just"/>
+            <a:endParaRPr lang="en-ES" sz="1600" dirty="0"/>
           </a:p>
         </p:txBody>
       </p:sp>
+      <p:sp>
+        <p:nvSpPr>
+          <p:cNvPr id="6" name="CuadroTexto 5">
+            <a:extLst>
+              <a:ext uri="{FF2B5EF4-FFF2-40B4-BE49-F238E27FC236}">
+                <a16:creationId xmlns:a16="http://schemas.microsoft.com/office/drawing/2014/main" id="{AC91448B-C5FD-2F6A-EAA6-A234D728F93C}"/>
+              </a:ext>
+            </a:extLst>
+          </p:cNvPr>
+          <p:cNvSpPr txBox="1"/>
+          <p:nvPr/>
+        </p:nvSpPr>
+        <p:spPr>
+          <a:xfrm>
+            <a:off x="4933390" y="4359002"/>
+            <a:ext cx="3711149" cy="400110"/>
+          </a:xfrm>
+          <a:prstGeom prst="rect">
+            <a:avLst/>
+          </a:prstGeom>
+          <a:solidFill>
+            <a:schemeClr val="bg1"/>
+          </a:solidFill>
+        </p:spPr>
+        <p:style>
+          <a:lnRef idx="1">
+            <a:schemeClr val="accent1"/>
+          </a:lnRef>
+          <a:fillRef idx="3">
+            <a:schemeClr val="accent1"/>
+          </a:fillRef>
+          <a:effectRef idx="2">
+            <a:schemeClr val="accent1"/>
+          </a:effectRef>
+          <a:fontRef idx="minor">
+            <a:schemeClr val="lt1"/>
+          </a:fontRef>
+        </p:style>
+        <p:txBody>
+          <a:bodyPr wrap="square" rtlCol="0">
+            <a:spAutoFit/>
+          </a:bodyPr>
+          <a:lstStyle/>
+          <a:p>
+            <a:pPr algn="ctr"/>
+            <a:r>
+              <a:rPr lang="es-ES" sz="2000" dirty="0">
+                <a:solidFill>
+                  <a:srgbClr val="FF0000"/>
+                </a:solidFill>
+              </a:rPr>
+              <a:t>Desempeño insuficiente</a:t>
+            </a:r>
+          </a:p>
+        </p:txBody>
+      </p:sp>
+      <p:pic>
+        <p:nvPicPr>
+          <p:cNvPr id="9" name="Imagen 8">
+            <a:extLst>
+              <a:ext uri="{FF2B5EF4-FFF2-40B4-BE49-F238E27FC236}">
+                <a16:creationId xmlns:a16="http://schemas.microsoft.com/office/drawing/2014/main" id="{DFE34DB1-1DCE-BDDB-C2E6-909DAA0FE4D2}"/>
+              </a:ext>
+            </a:extLst>
+          </p:cNvPr>
+          <p:cNvPicPr>
+            <a:picLocks noChangeAspect="1"/>
+          </p:cNvPicPr>
+          <p:nvPr/>
+        </p:nvPicPr>
+        <p:blipFill>
+          <a:blip r:embed="rId3"/>
+          <a:stretch>
+            <a:fillRect/>
+          </a:stretch>
+        </p:blipFill>
+        <p:spPr>
+          <a:xfrm>
+            <a:off x="4933390" y="1194098"/>
+            <a:ext cx="3711149" cy="2997127"/>
+          </a:xfrm>
+          <a:prstGeom prst="roundRect">
+            <a:avLst>
+              <a:gd name="adj" fmla="val 16667"/>
+            </a:avLst>
+          </a:prstGeom>
+          <a:ln>
+            <a:noFill/>
+          </a:ln>
+          <a:effectLst>
+            <a:outerShdw blurRad="76200" dist="38100" dir="7800000" algn="tl" rotWithShape="0">
+              <a:srgbClr val="000000">
+                <a:alpha val="40000"/>
+              </a:srgbClr>
+            </a:outerShdw>
+          </a:effectLst>
+          <a:scene3d>
+            <a:camera prst="orthographicFront"/>
+            <a:lightRig rig="contrasting" dir="t">
+              <a:rot lat="0" lon="0" rev="4200000"/>
+            </a:lightRig>
+          </a:scene3d>
+          <a:sp3d prstMaterial="plastic">
+            <a:bevelT w="381000" h="114300" prst="relaxedInset"/>
+            <a:contourClr>
+              <a:srgbClr val="969696"/>
+            </a:contourClr>
+          </a:sp3d>
+        </p:spPr>
+      </p:pic>
     </p:spTree>
     <p:extLst>
       <p:ext uri="{BB962C8B-B14F-4D97-AF65-F5344CB8AC3E}">
@@ -22844,66 +23077,6 @@
           </a:p>
         </p:txBody>
       </p:sp>
-      <p:pic>
-        <p:nvPicPr>
-          <p:cNvPr id="6" name="Imagen 5">
-            <a:extLst>
-              <a:ext uri="{FF2B5EF4-FFF2-40B4-BE49-F238E27FC236}">
-                <a16:creationId xmlns:a16="http://schemas.microsoft.com/office/drawing/2014/main" id="{C419C444-B510-41D1-18DA-A0EDA21E4FC5}"/>
-              </a:ext>
-            </a:extLst>
-          </p:cNvPr>
-          <p:cNvPicPr>
-            <a:picLocks noChangeAspect="1"/>
-          </p:cNvPicPr>
-          <p:nvPr/>
-        </p:nvPicPr>
-        <p:blipFill>
-          <a:blip r:embed="rId4"/>
-          <a:stretch>
-            <a:fillRect/>
-          </a:stretch>
-        </p:blipFill>
-        <p:spPr>
-          <a:xfrm>
-            <a:off x="860608" y="4046709"/>
-            <a:ext cx="3496237" cy="1114581"/>
-          </a:xfrm>
-          <a:prstGeom prst="rect">
-            <a:avLst/>
-          </a:prstGeom>
-        </p:spPr>
-      </p:pic>
-      <p:pic>
-        <p:nvPicPr>
-          <p:cNvPr id="8" name="Imagen 7">
-            <a:extLst>
-              <a:ext uri="{FF2B5EF4-FFF2-40B4-BE49-F238E27FC236}">
-                <a16:creationId xmlns:a16="http://schemas.microsoft.com/office/drawing/2014/main" id="{F191712F-AF11-545F-6745-913AE7E68860}"/>
-              </a:ext>
-            </a:extLst>
-          </p:cNvPr>
-          <p:cNvPicPr>
-            <a:picLocks noChangeAspect="1"/>
-          </p:cNvPicPr>
-          <p:nvPr/>
-        </p:nvPicPr>
-        <p:blipFill>
-          <a:blip r:embed="rId5"/>
-          <a:stretch>
-            <a:fillRect/>
-          </a:stretch>
-        </p:blipFill>
-        <p:spPr>
-          <a:xfrm>
-            <a:off x="913040" y="3122220"/>
-            <a:ext cx="1695687" cy="952633"/>
-          </a:xfrm>
-          <a:prstGeom prst="rect">
-            <a:avLst/>
-          </a:prstGeom>
-        </p:spPr>
-      </p:pic>
       <p:sp>
         <p:nvSpPr>
           <p:cNvPr id="9" name="CuadroTexto 8">
@@ -22919,7 +23092,7 @@
         <p:spPr>
           <a:xfrm>
             <a:off x="4356845" y="3077091"/>
-            <a:ext cx="4628648" cy="2123658"/>
+            <a:ext cx="4628648" cy="1938992"/>
           </a:xfrm>
           <a:prstGeom prst="rect">
             <a:avLst/>
@@ -22988,21 +23161,8 @@
             </a:r>
             <a:r>
               <a:rPr lang="en-GB" sz="1200" dirty="0"/>
-              <a:t> </a:t>
-            </a:r>
-            <a:r>
-              <a:rPr lang="en-GB" sz="1200" dirty="0" err="1"/>
-              <a:t>significativas</a:t>
-            </a:r>
-            <a:r>
-              <a:rPr lang="en-GB" sz="1200" dirty="0"/>
-              <a:t> </a:t>
-            </a:r>
-            <a:r>
-              <a:rPr lang="en-GB" sz="1200" dirty="0" err="1"/>
-              <a:t>en</a:t>
-            </a:r>
-            <a:endParaRPr lang="en-GB" sz="1200" dirty="0"/>
+              <a:t>: </a:t>
+            </a:r>
           </a:p>
           <a:p>
             <a:pPr marL="171450" indent="-171450">
@@ -23039,44 +23199,41 @@
               <a:rPr lang="es-ES" sz="1200" dirty="0" err="1"/>
               <a:t>IsActiveMemeber</a:t>
             </a:r>
-            <a:endParaRPr lang="es-ES" sz="1200" dirty="0"/>
+            <a:r>
+              <a:rPr lang="es-ES" sz="1200" dirty="0"/>
+              <a:t>         </a:t>
+            </a:r>
           </a:p>
           <a:p>
             <a:r>
               <a:rPr lang="es-ES" sz="1200" dirty="0"/>
-              <a:t>                </a:t>
+              <a:t> </a:t>
             </a:r>
           </a:p>
           <a:p>
             <a:r>
-              <a:rPr lang="en-GB" sz="1200" dirty="0"/>
-              <a:t>                Tests de </a:t>
-            </a:r>
-            <a:r>
-              <a:rPr lang="en-GB" sz="1200" dirty="0" err="1"/>
-              <a:t>independencia</a:t>
-            </a:r>
-            <a:r>
-              <a:rPr lang="en-GB" sz="1200" dirty="0"/>
-              <a:t> (Chi-</a:t>
-            </a:r>
-            <a:r>
-              <a:rPr lang="en-GB" sz="1200" dirty="0" err="1"/>
-              <a:t>cuadrado</a:t>
-            </a:r>
-            <a:r>
-              <a:rPr lang="en-GB" sz="1200" dirty="0"/>
-              <a:t>)</a:t>
-            </a:r>
-            <a:r>
               <a:rPr lang="es-ES" sz="1200" dirty="0"/>
-              <a:t>           </a:t>
-            </a:r>
-          </a:p>
-          <a:p>
+              <a:t>                 </a:t>
+            </a:r>
+            <a:r>
+              <a:rPr lang="es-ES" sz="1200" dirty="0" err="1"/>
+              <a:t>Corrovorar</a:t>
+            </a:r>
             <a:r>
               <a:rPr lang="es-ES" sz="1200" dirty="0"/>
               <a:t> </a:t>
+            </a:r>
+            <a:r>
+              <a:rPr lang="es-ES" sz="1200" dirty="0" err="1"/>
+              <a:t>via</a:t>
+            </a:r>
+            <a:r>
+              <a:rPr lang="es-ES" sz="1200" dirty="0"/>
+              <a:t> </a:t>
+            </a:r>
+            <a:r>
+              <a:rPr lang="es-ES" sz="1200" b="1" i="1" dirty="0"/>
+              <a:t>Test estadísticos adecuados</a:t>
             </a:r>
           </a:p>
           <a:p>
@@ -23090,66 +23247,6 @@
           </a:p>
         </p:txBody>
       </p:sp>
-      <p:pic>
-        <p:nvPicPr>
-          <p:cNvPr id="11" name="Imagen 10">
-            <a:extLst>
-              <a:ext uri="{FF2B5EF4-FFF2-40B4-BE49-F238E27FC236}">
-                <a16:creationId xmlns:a16="http://schemas.microsoft.com/office/drawing/2014/main" id="{69979F9F-1699-FEEA-4104-C18227B154EA}"/>
-              </a:ext>
-            </a:extLst>
-          </p:cNvPr>
-          <p:cNvPicPr>
-            <a:picLocks noChangeAspect="1"/>
-          </p:cNvPicPr>
-          <p:nvPr/>
-        </p:nvPicPr>
-        <p:blipFill>
-          <a:blip r:embed="rId6"/>
-          <a:stretch>
-            <a:fillRect/>
-          </a:stretch>
-        </p:blipFill>
-        <p:spPr>
-          <a:xfrm>
-            <a:off x="2545491" y="4046709"/>
-            <a:ext cx="1706492" cy="1019914"/>
-          </a:xfrm>
-          <a:prstGeom prst="rect">
-            <a:avLst/>
-          </a:prstGeom>
-        </p:spPr>
-      </p:pic>
-      <p:pic>
-        <p:nvPicPr>
-          <p:cNvPr id="13" name="Imagen 12">
-            <a:extLst>
-              <a:ext uri="{FF2B5EF4-FFF2-40B4-BE49-F238E27FC236}">
-                <a16:creationId xmlns:a16="http://schemas.microsoft.com/office/drawing/2014/main" id="{B57E5F5A-38EB-81A4-5B57-E486F1B32098}"/>
-              </a:ext>
-            </a:extLst>
-          </p:cNvPr>
-          <p:cNvPicPr>
-            <a:picLocks noChangeAspect="1"/>
-          </p:cNvPicPr>
-          <p:nvPr/>
-        </p:nvPicPr>
-        <p:blipFill>
-          <a:blip r:embed="rId7"/>
-          <a:stretch>
-            <a:fillRect/>
-          </a:stretch>
-        </p:blipFill>
-        <p:spPr>
-          <a:xfrm>
-            <a:off x="2552000" y="3122220"/>
-            <a:ext cx="1804845" cy="1017824"/>
-          </a:xfrm>
-          <a:prstGeom prst="rect">
-            <a:avLst/>
-          </a:prstGeom>
-        </p:spPr>
-      </p:pic>
       <p:cxnSp>
         <p:nvCxnSpPr>
           <p:cNvPr id="5" name="Curved Connector 4">
@@ -23228,12 +23325,102 @@
           </a:fontRef>
         </p:style>
       </p:cxnSp>
+      <p:pic>
+        <p:nvPicPr>
+          <p:cNvPr id="2" name="Imagen 4">
+            <a:extLst>
+              <a:ext uri="{FF2B5EF4-FFF2-40B4-BE49-F238E27FC236}">
+                <a16:creationId xmlns:a16="http://schemas.microsoft.com/office/drawing/2014/main" id="{B1173316-6AF7-67D0-107C-20CBA466E19B}"/>
+              </a:ext>
+            </a:extLst>
+          </p:cNvPr>
+          <p:cNvPicPr>
+            <a:picLocks noChangeAspect="1"/>
+          </p:cNvPicPr>
+          <p:nvPr/>
+        </p:nvPicPr>
+        <p:blipFill>
+          <a:blip r:embed="rId4"/>
+          <a:stretch>
+            <a:fillRect/>
+          </a:stretch>
+        </p:blipFill>
+        <p:spPr>
+          <a:xfrm>
+            <a:off x="341107" y="3174886"/>
+            <a:ext cx="1804845" cy="964034"/>
+          </a:xfrm>
+          <a:prstGeom prst="rect">
+            <a:avLst/>
+          </a:prstGeom>
+        </p:spPr>
+      </p:pic>
+      <p:pic>
+        <p:nvPicPr>
+          <p:cNvPr id="7" name="Imagen 9">
+            <a:extLst>
+              <a:ext uri="{FF2B5EF4-FFF2-40B4-BE49-F238E27FC236}">
+                <a16:creationId xmlns:a16="http://schemas.microsoft.com/office/drawing/2014/main" id="{E0ACC5E0-C09A-511E-E3EE-39E091D80290}"/>
+              </a:ext>
+            </a:extLst>
+          </p:cNvPr>
+          <p:cNvPicPr>
+            <a:picLocks noChangeAspect="1"/>
+          </p:cNvPicPr>
+          <p:nvPr/>
+        </p:nvPicPr>
+        <p:blipFill>
+          <a:blip r:embed="rId5"/>
+          <a:stretch>
+            <a:fillRect/>
+          </a:stretch>
+        </p:blipFill>
+        <p:spPr>
+          <a:xfrm>
+            <a:off x="2145952" y="3174886"/>
+            <a:ext cx="1853088" cy="964034"/>
+          </a:xfrm>
+          <a:prstGeom prst="rect">
+            <a:avLst/>
+          </a:prstGeom>
+        </p:spPr>
+      </p:pic>
+      <p:pic>
+        <p:nvPicPr>
+          <p:cNvPr id="12" name="Imagen 13">
+            <a:extLst>
+              <a:ext uri="{FF2B5EF4-FFF2-40B4-BE49-F238E27FC236}">
+                <a16:creationId xmlns:a16="http://schemas.microsoft.com/office/drawing/2014/main" id="{3C5C6799-154C-7AEC-6A8B-086B5E1D4CFB}"/>
+              </a:ext>
+            </a:extLst>
+          </p:cNvPr>
+          <p:cNvPicPr>
+            <a:picLocks noChangeAspect="1"/>
+          </p:cNvPicPr>
+          <p:nvPr/>
+        </p:nvPicPr>
+        <p:blipFill>
+          <a:blip r:embed="rId6"/>
+          <a:stretch>
+            <a:fillRect/>
+          </a:stretch>
+        </p:blipFill>
+        <p:spPr>
+          <a:xfrm>
+            <a:off x="1273962" y="4036329"/>
+            <a:ext cx="1857544" cy="981992"/>
+          </a:xfrm>
+          <a:prstGeom prst="rect">
+            <a:avLst/>
+          </a:prstGeom>
+        </p:spPr>
+      </p:pic>
       <p:sp>
         <p:nvSpPr>
-          <p:cNvPr id="14" name="Right Arrow 13">
+          <p:cNvPr id="15" name="Right Arrow 14">
             <a:extLst>
               <a:ext uri="{FF2B5EF4-FFF2-40B4-BE49-F238E27FC236}">
-                <a16:creationId xmlns:a16="http://schemas.microsoft.com/office/drawing/2014/main" id="{454349B8-B58B-8548-F0C1-A327E55F2878}"/>
+                <a16:creationId xmlns:a16="http://schemas.microsoft.com/office/drawing/2014/main" id="{B4E95F88-065C-E7E8-A4BC-B72B44F1B180}"/>
               </a:ext>
             </a:extLst>
           </p:cNvPr>
@@ -23242,7 +23429,7 @@
         </p:nvSpPr>
         <p:spPr>
           <a:xfrm>
-            <a:off x="4572000" y="4225539"/>
+            <a:off x="4633632" y="4218586"/>
             <a:ext cx="482009" cy="199435"/>
           </a:xfrm>
           <a:prstGeom prst="rightArrow">
@@ -23431,8 +23618,8 @@
         </p:nvSpPr>
         <p:spPr>
           <a:xfrm>
-            <a:off x="5891456" y="1183710"/>
-            <a:ext cx="2689411" cy="2154436"/>
+            <a:off x="5865497" y="1044845"/>
+            <a:ext cx="2689411" cy="2462213"/>
           </a:xfrm>
           <a:prstGeom prst="rect">
             <a:avLst/>
@@ -23448,9 +23635,90 @@
           <a:lstStyle/>
           <a:p>
             <a:r>
-              <a:rPr lang="es-ES" sz="1000" dirty="0"/>
-              <a:t>Variables numéricas significativas </a:t>
-            </a:r>
+              <a:rPr lang="en-GB" sz="1000" b="1" dirty="0" err="1"/>
+              <a:t>Segmentación</a:t>
+            </a:r>
+            <a:r>
+              <a:rPr lang="en-GB" sz="1000" b="1" dirty="0"/>
+              <a:t> </a:t>
+            </a:r>
+            <a:r>
+              <a:rPr lang="en-GB" sz="1000" b="1" dirty="0" err="1"/>
+              <a:t>Detectada</a:t>
+            </a:r>
+            <a:endParaRPr lang="en-GB" sz="1000" b="1" dirty="0"/>
+          </a:p>
+          <a:p>
+            <a:pPr marL="171450" indent="-171450">
+              <a:buFontTx/>
+              <a:buChar char="-"/>
+            </a:pPr>
+            <a:r>
+              <a:rPr lang="en-GB" sz="1000" dirty="0" err="1"/>
+              <a:t>Muestran</a:t>
+            </a:r>
+            <a:r>
+              <a:rPr lang="en-GB" sz="1000" dirty="0"/>
+              <a:t> </a:t>
+            </a:r>
+            <a:r>
+              <a:rPr lang="en-GB" sz="1000" dirty="0" err="1"/>
+              <a:t>patrones</a:t>
+            </a:r>
+            <a:r>
+              <a:rPr lang="en-GB" sz="1000" dirty="0"/>
+              <a:t> </a:t>
+            </a:r>
+            <a:r>
+              <a:rPr lang="en-GB" sz="1000" dirty="0" err="1"/>
+              <a:t>diferenciados</a:t>
+            </a:r>
+            <a:r>
+              <a:rPr lang="en-GB" sz="1000" dirty="0"/>
+              <a:t> </a:t>
+            </a:r>
+            <a:r>
+              <a:rPr lang="en-GB" sz="1000" dirty="0" err="1"/>
+              <a:t>según</a:t>
+            </a:r>
+            <a:r>
+              <a:rPr lang="en-GB" sz="1000" dirty="0"/>
+              <a:t> </a:t>
+            </a:r>
+            <a:r>
+              <a:rPr lang="en-GB" sz="1000" b="1" dirty="0"/>
+              <a:t>Exited</a:t>
+            </a:r>
+            <a:r>
+              <a:rPr lang="en-GB" sz="1000" dirty="0"/>
+              <a:t> → </a:t>
+            </a:r>
+            <a:r>
+              <a:rPr lang="en-GB" sz="1000" dirty="0" err="1"/>
+              <a:t>alta</a:t>
+            </a:r>
+            <a:r>
+              <a:rPr lang="en-GB" sz="1000" dirty="0"/>
+              <a:t> </a:t>
+            </a:r>
+            <a:r>
+              <a:rPr lang="en-GB" sz="1000" dirty="0" err="1"/>
+              <a:t>capacidad</a:t>
+            </a:r>
+            <a:r>
+              <a:rPr lang="en-GB" sz="1000" dirty="0"/>
+              <a:t> predictive</a:t>
+            </a:r>
+          </a:p>
+          <a:p>
+            <a:endParaRPr lang="en-GB" sz="1000" dirty="0"/>
+          </a:p>
+          <a:p>
+            <a:r>
+              <a:rPr lang="es-ES" sz="1000" b="1" dirty="0"/>
+              <a:t>Conclusión respecto bivariante</a:t>
+            </a:r>
+            <a:endParaRPr lang="es-ES" sz="1000" dirty="0"/>
           </a:p>
           <a:p>
             <a:pPr marL="285750" indent="-285750">
@@ -23459,7 +23727,7 @@
             </a:pPr>
             <a:r>
               <a:rPr lang="es-ES" sz="1000" dirty="0"/>
-              <a:t>Age</a:t>
+              <a:t>Balance</a:t>
             </a:r>
           </a:p>
           <a:p>
@@ -23469,175 +23737,49 @@
             </a:pPr>
             <a:r>
               <a:rPr lang="es-ES" sz="1000" dirty="0"/>
-              <a:t>Balance</a:t>
-            </a:r>
+              <a:t>Age </a:t>
+            </a:r>
+          </a:p>
+          <a:p>
+            <a:pPr marL="285750" indent="-285750">
+              <a:buFontTx/>
+              <a:buChar char="-"/>
+            </a:pPr>
+            <a:r>
+              <a:rPr lang="es-ES" sz="1000" dirty="0" err="1"/>
+              <a:t>NumOfProducts</a:t>
+            </a:r>
+            <a:endParaRPr lang="es-ES" sz="1000" dirty="0"/>
+          </a:p>
+          <a:p>
+            <a:pPr marL="285750" indent="-285750">
+              <a:buFontTx/>
+              <a:buChar char="-"/>
+            </a:pPr>
+            <a:r>
+              <a:rPr lang="es-ES" sz="1000" dirty="0" err="1"/>
+              <a:t>CreditScore</a:t>
+            </a:r>
+            <a:endParaRPr lang="es-ES" sz="1000" dirty="0"/>
+          </a:p>
+          <a:p>
+            <a:endParaRPr lang="es-ES" sz="1000" dirty="0"/>
+          </a:p>
+          <a:p>
+            <a:r>
+              <a:rPr lang="es-ES" sz="1000" dirty="0"/>
+              <a:t>               </a:t>
+            </a:r>
+            <a:r>
+              <a:rPr lang="es-ES" sz="1000" b="1" i="1" dirty="0"/>
+              <a:t>Test estadísticos adecuados</a:t>
+            </a:r>
+            <a:endParaRPr lang="es-ES" sz="1000" dirty="0"/>
           </a:p>
           <a:p>
             <a:endParaRPr lang="en-GB" sz="1000" dirty="0"/>
           </a:p>
           <a:p>
-            <a:r>
-              <a:rPr lang="en-GB" sz="1000" dirty="0" err="1"/>
-              <a:t>Evitar</a:t>
-            </a:r>
-            <a:r>
-              <a:rPr lang="en-GB" sz="1000" dirty="0"/>
-              <a:t> </a:t>
-            </a:r>
-            <a:r>
-              <a:rPr lang="en-GB" sz="1000" dirty="0" err="1"/>
-              <a:t>multicolinealidad</a:t>
-            </a:r>
-            <a:endParaRPr lang="en-GB" sz="1000" dirty="0"/>
-          </a:p>
-          <a:p>
-            <a:r>
-              <a:rPr lang="en-GB" sz="1000" dirty="0"/>
-              <a:t>• </a:t>
-            </a:r>
-            <a:r>
-              <a:rPr lang="en-GB" sz="1000" dirty="0" err="1"/>
-              <a:t>Aplicar</a:t>
-            </a:r>
-            <a:r>
-              <a:rPr lang="en-GB" sz="1000" dirty="0"/>
-              <a:t> </a:t>
-            </a:r>
-            <a:r>
-              <a:rPr lang="en-GB" sz="1000" dirty="0" err="1"/>
-              <a:t>técnicas</a:t>
-            </a:r>
-            <a:r>
-              <a:rPr lang="en-GB" sz="1000" dirty="0"/>
-              <a:t> de </a:t>
-            </a:r>
-            <a:r>
-              <a:rPr lang="en-GB" sz="1000" dirty="0" err="1"/>
-              <a:t>selección</a:t>
-            </a:r>
-            <a:r>
-              <a:rPr lang="en-GB" sz="1000" dirty="0"/>
-              <a:t> de features</a:t>
-            </a:r>
-          </a:p>
-          <a:p>
-            <a:r>
-              <a:rPr lang="en-GB" sz="1000" dirty="0"/>
-              <a:t>• </a:t>
-            </a:r>
-            <a:r>
-              <a:rPr lang="en-GB" sz="1000" dirty="0" err="1"/>
-              <a:t>Priorizar</a:t>
-            </a:r>
-            <a:r>
-              <a:rPr lang="en-GB" sz="1000" dirty="0"/>
-              <a:t> variables </a:t>
-            </a:r>
-            <a:r>
-              <a:rPr lang="en-GB" sz="1000" dirty="0" err="1"/>
-              <a:t>originales</a:t>
-            </a:r>
-            <a:r>
-              <a:rPr lang="en-GB" sz="1000" dirty="0"/>
-              <a:t> </a:t>
-            </a:r>
-            <a:r>
-              <a:rPr lang="en-GB" sz="1000" dirty="0" err="1"/>
-              <a:t>sobre</a:t>
-            </a:r>
-            <a:r>
-              <a:rPr lang="en-GB" sz="1000" dirty="0"/>
-              <a:t> </a:t>
-            </a:r>
-            <a:r>
-              <a:rPr lang="en-GB" sz="1000" dirty="0" err="1"/>
-              <a:t>derivadas</a:t>
-            </a:r>
-            <a:endParaRPr lang="en-GB" sz="1000" dirty="0"/>
-          </a:p>
-          <a:p>
-            <a:endParaRPr lang="en-GB" sz="1000" dirty="0"/>
-          </a:p>
-          <a:p>
-            <a:r>
-              <a:rPr lang="en-GB" sz="1000" b="1" dirty="0" err="1"/>
-              <a:t>Segmentación</a:t>
-            </a:r>
-            <a:r>
-              <a:rPr lang="en-GB" sz="1000" b="1" dirty="0"/>
-              <a:t> </a:t>
-            </a:r>
-            <a:r>
-              <a:rPr lang="en-GB" sz="1000" b="1" dirty="0" err="1"/>
-              <a:t>Detectada</a:t>
-            </a:r>
-            <a:endParaRPr lang="en-GB" sz="1000" b="1" dirty="0"/>
-          </a:p>
-          <a:p>
-            <a:r>
-              <a:rPr lang="en-GB" sz="1000" dirty="0"/>
-              <a:t>- </a:t>
-            </a:r>
-            <a:r>
-              <a:rPr lang="en-GB" sz="1000" dirty="0" err="1"/>
-              <a:t>Muestran</a:t>
-            </a:r>
-            <a:r>
-              <a:rPr lang="en-GB" sz="1000" dirty="0"/>
-              <a:t> </a:t>
-            </a:r>
-            <a:r>
-              <a:rPr lang="en-GB" sz="1000" dirty="0" err="1"/>
-              <a:t>patrones</a:t>
-            </a:r>
-            <a:r>
-              <a:rPr lang="en-GB" sz="1000" dirty="0"/>
-              <a:t> </a:t>
-            </a:r>
-            <a:r>
-              <a:rPr lang="en-GB" sz="1000" dirty="0" err="1"/>
-              <a:t>diferenciados</a:t>
-            </a:r>
-            <a:r>
-              <a:rPr lang="en-GB" sz="1000" dirty="0"/>
-              <a:t> </a:t>
-            </a:r>
-            <a:r>
-              <a:rPr lang="en-GB" sz="1000" dirty="0" err="1"/>
-              <a:t>según</a:t>
-            </a:r>
-            <a:r>
-              <a:rPr lang="en-GB" sz="1000" dirty="0"/>
-              <a:t> </a:t>
-            </a:r>
-            <a:r>
-              <a:rPr lang="en-GB" sz="1000" b="1" dirty="0"/>
-              <a:t>Exited</a:t>
-            </a:r>
-            <a:r>
-              <a:rPr lang="en-GB" sz="1000" dirty="0"/>
-              <a:t> → </a:t>
-            </a:r>
-            <a:r>
-              <a:rPr lang="en-GB" sz="1000" dirty="0" err="1"/>
-              <a:t>alta</a:t>
-            </a:r>
-            <a:r>
-              <a:rPr lang="en-GB" sz="1000" dirty="0"/>
-              <a:t> </a:t>
-            </a:r>
-            <a:r>
-              <a:rPr lang="en-GB" sz="1000" dirty="0" err="1"/>
-              <a:t>capacidad</a:t>
-            </a:r>
-            <a:r>
-              <a:rPr lang="en-GB" sz="1000" dirty="0"/>
-              <a:t> </a:t>
-            </a:r>
-            <a:r>
-              <a:rPr lang="en-GB" sz="1000" dirty="0" err="1"/>
-              <a:t>predictiva</a:t>
-            </a:r>
             <a:endParaRPr lang="en-GB" sz="1000" dirty="0"/>
           </a:p>
           <a:p>
@@ -24100,6 +24242,52 @@
           </a:p>
         </p:txBody>
       </p:sp>
+      <p:sp>
+        <p:nvSpPr>
+          <p:cNvPr id="2" name="Right Arrow 1">
+            <a:extLst>
+              <a:ext uri="{FF2B5EF4-FFF2-40B4-BE49-F238E27FC236}">
+                <a16:creationId xmlns:a16="http://schemas.microsoft.com/office/drawing/2014/main" id="{ECF9AD90-B841-1332-2A25-B79D688CC163}"/>
+              </a:ext>
+            </a:extLst>
+          </p:cNvPr>
+          <p:cNvSpPr/>
+          <p:nvPr/>
+        </p:nvSpPr>
+        <p:spPr>
+          <a:xfrm>
+            <a:off x="5865497" y="2909338"/>
+            <a:ext cx="482009" cy="199435"/>
+          </a:xfrm>
+          <a:prstGeom prst="rightArrow">
+            <a:avLst/>
+          </a:prstGeom>
+        </p:spPr>
+        <p:style>
+          <a:lnRef idx="2">
+            <a:schemeClr val="accent1">
+              <a:shade val="15000"/>
+            </a:schemeClr>
+          </a:lnRef>
+          <a:fillRef idx="1">
+            <a:schemeClr val="accent1"/>
+          </a:fillRef>
+          <a:effectRef idx="0">
+            <a:schemeClr val="accent1"/>
+          </a:effectRef>
+          <a:fontRef idx="minor">
+            <a:schemeClr val="lt1"/>
+          </a:fontRef>
+        </p:style>
+        <p:txBody>
+          <a:bodyPr rtlCol="0" anchor="ctr"/>
+          <a:lstStyle/>
+          <a:p>
+            <a:pPr algn="ctr"/>
+            <a:endParaRPr lang="en-ES"/>
+          </a:p>
+        </p:txBody>
+      </p:sp>
     </p:spTree>
     <p:extLst>
       <p:ext uri="{BB962C8B-B14F-4D97-AF65-F5344CB8AC3E}">
@@ -24118,13 +24306,7 @@
   <p:cSld>
     <p:spTree>
       <p:nvGrpSpPr>
-        <p:cNvPr id="1" name="Shape 620">
-          <a:extLst>
-            <a:ext uri="{FF2B5EF4-FFF2-40B4-BE49-F238E27FC236}">
-              <a16:creationId xmlns:a16="http://schemas.microsoft.com/office/drawing/2014/main" id="{807DF698-F9EC-1757-A445-D83603E11B09}"/>
-            </a:ext>
-          </a:extLst>
-        </p:cNvPr>
+        <p:cNvPr id="1" name="Shape 620"/>
         <p:cNvGrpSpPr/>
         <p:nvPr/>
       </p:nvGrpSpPr>
@@ -24138,13 +24320,7 @@
       </p:grpSpPr>
       <p:sp>
         <p:nvSpPr>
-          <p:cNvPr id="633" name="Google Shape;633;p34">
-            <a:extLst>
-              <a:ext uri="{FF2B5EF4-FFF2-40B4-BE49-F238E27FC236}">
-                <a16:creationId xmlns:a16="http://schemas.microsoft.com/office/drawing/2014/main" id="{2899A42E-A5F5-458B-1B04-D602FDAE3254}"/>
-              </a:ext>
-            </a:extLst>
-          </p:cNvPr>
+          <p:cNvPr id="633" name="Google Shape;633;p34"/>
           <p:cNvSpPr txBox="1">
             <a:spLocks noGrp="1"/>
           </p:cNvSpPr>
@@ -24154,7 +24330,7 @@
         </p:nvSpPr>
         <p:spPr>
           <a:xfrm>
-            <a:off x="720000" y="227362"/>
+            <a:off x="720000" y="184498"/>
             <a:ext cx="7704000" cy="572700"/>
           </a:xfrm>
           <a:prstGeom prst="rect">
@@ -24174,7 +24350,7 @@
             </a:r>
             <a:r>
               <a:rPr lang="es-ES" dirty="0" err="1"/>
-              <a:t>Missings</a:t>
+              <a:t>Missing</a:t>
             </a:r>
             <a:endParaRPr dirty="0"/>
           </a:p>
@@ -24182,13 +24358,7 @@
       </p:sp>
       <p:pic>
         <p:nvPicPr>
-          <p:cNvPr id="6" name="Imagen 5">
-            <a:extLst>
-              <a:ext uri="{FF2B5EF4-FFF2-40B4-BE49-F238E27FC236}">
-                <a16:creationId xmlns:a16="http://schemas.microsoft.com/office/drawing/2014/main" id="{5F92A851-FE02-6BF4-670C-99083B0FEB62}"/>
-              </a:ext>
-            </a:extLst>
-          </p:cNvPr>
+          <p:cNvPr id="6" name="Imagen 5"/>
           <p:cNvPicPr>
             <a:picLocks noChangeAspect="1"/>
           </p:cNvPicPr>
@@ -24202,8 +24372,8 @@
         </p:blipFill>
         <p:spPr>
           <a:xfrm>
-            <a:off x="231718" y="704478"/>
-            <a:ext cx="3117890" cy="2090109"/>
+            <a:off x="20443" y="2251639"/>
+            <a:ext cx="4381801" cy="2848282"/>
           </a:xfrm>
           <a:prstGeom prst="rect">
             <a:avLst/>
@@ -24212,13 +24382,7 @@
       </p:pic>
       <p:pic>
         <p:nvPicPr>
-          <p:cNvPr id="8" name="Imagen 7">
-            <a:extLst>
-              <a:ext uri="{FF2B5EF4-FFF2-40B4-BE49-F238E27FC236}">
-                <a16:creationId xmlns:a16="http://schemas.microsoft.com/office/drawing/2014/main" id="{4A959802-F2AB-6370-7B58-E78D7098AE1B}"/>
-              </a:ext>
-            </a:extLst>
-          </p:cNvPr>
+          <p:cNvPr id="8" name="Imagen 7"/>
           <p:cNvPicPr>
             <a:picLocks noChangeAspect="1"/>
           </p:cNvPicPr>
@@ -24232,8 +24396,8 @@
         </p:blipFill>
         <p:spPr>
           <a:xfrm>
-            <a:off x="231718" y="2794587"/>
-            <a:ext cx="3251738" cy="2153928"/>
+            <a:off x="4402244" y="2240217"/>
+            <a:ext cx="4626707" cy="2872676"/>
           </a:xfrm>
           <a:prstGeom prst="rect">
             <a:avLst/>
@@ -24242,10 +24406,10 @@
       </p:pic>
       <p:sp>
         <p:nvSpPr>
-          <p:cNvPr id="3" name="Rounded Rectangle 2">
+          <p:cNvPr id="2" name="Rounded Rectangle 1">
             <a:extLst>
               <a:ext uri="{FF2B5EF4-FFF2-40B4-BE49-F238E27FC236}">
-                <a16:creationId xmlns:a16="http://schemas.microsoft.com/office/drawing/2014/main" id="{80C9A3E0-81F8-A41F-C787-ECE02F73D8C0}"/>
+                <a16:creationId xmlns:a16="http://schemas.microsoft.com/office/drawing/2014/main" id="{FBFCB37C-4001-05C8-8D9E-DAB7D1D18255}"/>
               </a:ext>
             </a:extLst>
           </p:cNvPr>
@@ -24254,8 +24418,8 @@
         </p:nvSpPr>
         <p:spPr>
           <a:xfrm>
-            <a:off x="3909653" y="723259"/>
-            <a:ext cx="2282342" cy="248717"/>
+            <a:off x="115049" y="709411"/>
+            <a:ext cx="1432397" cy="248717"/>
           </a:xfrm>
           <a:prstGeom prst="roundRect">
             <a:avLst/>
@@ -24291,10 +24455,10 @@
       </p:sp>
       <p:sp>
         <p:nvSpPr>
-          <p:cNvPr id="4" name="TextBox 3">
+          <p:cNvPr id="3" name="TextBox 2">
             <a:extLst>
               <a:ext uri="{FF2B5EF4-FFF2-40B4-BE49-F238E27FC236}">
-                <a16:creationId xmlns:a16="http://schemas.microsoft.com/office/drawing/2014/main" id="{B09C4AB6-E6F8-2CC6-4731-0E30548E7593}"/>
+                <a16:creationId xmlns:a16="http://schemas.microsoft.com/office/drawing/2014/main" id="{F0342EB7-A386-1AD3-0443-2B2E55CF4E59}"/>
               </a:ext>
             </a:extLst>
           </p:cNvPr>
@@ -24303,8 +24467,8 @@
         </p:nvSpPr>
         <p:spPr>
           <a:xfrm>
-            <a:off x="3972153" y="1082650"/>
-            <a:ext cx="2589581" cy="1384995"/>
+            <a:off x="115049" y="1024623"/>
+            <a:ext cx="2589581" cy="1231106"/>
           </a:xfrm>
           <a:prstGeom prst="rect">
             <a:avLst/>
@@ -24318,37 +24482,37 @@
           <a:lstStyle/>
           <a:p>
             <a:r>
-              <a:rPr lang="en-GB" b="1" dirty="0"/>
+              <a:rPr lang="en-GB" sz="1200" b="1" dirty="0"/>
               <a:t>30% </a:t>
             </a:r>
             <a:r>
-              <a:rPr lang="en-GB" dirty="0" err="1"/>
+              <a:rPr lang="en-GB" sz="1200" dirty="0" err="1"/>
               <a:t>en</a:t>
             </a:r>
             <a:r>
-              <a:rPr lang="en-GB" dirty="0"/>
+              <a:rPr lang="en-GB" sz="1200" dirty="0"/>
               <a:t> </a:t>
             </a:r>
             <a:r>
-              <a:rPr lang="en-GB" dirty="0" err="1"/>
+              <a:rPr lang="en-GB" sz="1200" dirty="0" err="1"/>
               <a:t>todas</a:t>
             </a:r>
             <a:r>
-              <a:rPr lang="en-GB" dirty="0"/>
+              <a:rPr lang="en-GB" sz="1200" dirty="0"/>
               <a:t> las variables (</a:t>
             </a:r>
             <a:r>
-              <a:rPr lang="en-GB" dirty="0" err="1"/>
+              <a:rPr lang="en-GB" sz="1200" dirty="0" err="1"/>
               <a:t>excepto</a:t>
             </a:r>
             <a:r>
-              <a:rPr lang="en-GB" dirty="0"/>
+              <a:rPr lang="en-GB" sz="1200" dirty="0"/>
               <a:t> ID)</a:t>
             </a:r>
           </a:p>
           <a:p>
             <a:r>
-              <a:rPr lang="en-GB" b="1" dirty="0">
+              <a:rPr lang="en-GB" sz="1200" b="1" dirty="0">
                 <a:highlight>
                   <a:srgbClr val="FFFF00"/>
                 </a:highlight>
@@ -24358,36 +24522,36 @@
           </a:p>
           <a:p>
             <a:r>
-              <a:rPr lang="en-GB" b="1" dirty="0"/>
+              <a:rPr lang="en-GB" sz="1200" b="1" dirty="0"/>
               <a:t>p-</a:t>
             </a:r>
             <a:r>
-              <a:rPr lang="en-GB" b="1" dirty="0" err="1"/>
+              <a:rPr lang="en-GB" sz="1200" b="1" dirty="0" err="1"/>
               <a:t>valor</a:t>
             </a:r>
             <a:r>
-              <a:rPr lang="en-GB" b="1" dirty="0"/>
+              <a:rPr lang="en-GB" sz="1200" b="1" dirty="0"/>
               <a:t> = 0.39</a:t>
             </a:r>
           </a:p>
           <a:p>
             <a:r>
-              <a:rPr lang="en-GB" dirty="0"/>
+              <a:rPr lang="en-GB" sz="1200" dirty="0"/>
               <a:t>✓ </a:t>
             </a:r>
             <a:r>
-              <a:rPr lang="en-GB" dirty="0" err="1"/>
+              <a:rPr lang="en-GB" sz="1200" dirty="0" err="1"/>
               <a:t>Aleatoriedad</a:t>
             </a:r>
             <a:r>
-              <a:rPr lang="en-GB" dirty="0"/>
+              <a:rPr lang="en-GB" sz="1200" dirty="0"/>
               <a:t> </a:t>
             </a:r>
             <a:r>
-              <a:rPr lang="en-GB" dirty="0" err="1"/>
+              <a:rPr lang="en-GB" sz="1200" dirty="0" err="1"/>
               <a:t>confirmada</a:t>
             </a:r>
-            <a:endParaRPr lang="en-GB" dirty="0"/>
+            <a:endParaRPr lang="en-GB" sz="1200" dirty="0"/>
           </a:p>
           <a:p>
             <a:endParaRPr lang="en-ES" dirty="0"/>
@@ -24396,10 +24560,10 @@
       </p:sp>
       <p:sp>
         <p:nvSpPr>
-          <p:cNvPr id="7" name="TextBox 6">
+          <p:cNvPr id="4" name="TextBox 3">
             <a:extLst>
               <a:ext uri="{FF2B5EF4-FFF2-40B4-BE49-F238E27FC236}">
-                <a16:creationId xmlns:a16="http://schemas.microsoft.com/office/drawing/2014/main" id="{12786B15-69B6-809E-8275-A012869310C1}"/>
+                <a16:creationId xmlns:a16="http://schemas.microsoft.com/office/drawing/2014/main" id="{DAF17CAC-247E-268B-7A5C-1A3385D97F3B}"/>
               </a:ext>
             </a:extLst>
           </p:cNvPr>
@@ -24408,8 +24572,8 @@
         </p:nvSpPr>
         <p:spPr>
           <a:xfrm>
-            <a:off x="6456549" y="530782"/>
-            <a:ext cx="2622821" cy="2546851"/>
+            <a:off x="2240937" y="605827"/>
+            <a:ext cx="3391877" cy="1269578"/>
           </a:xfrm>
           <a:prstGeom prst="rect">
             <a:avLst/>
@@ -24435,7 +24599,7 @@
               </a:rPr>
             </a:br>
             <a:r>
-              <a:rPr lang="en-GB" sz="1200" b="1" i="0" dirty="0" err="1">
+              <a:rPr lang="en-GB" sz="1100" b="1" i="0" dirty="0" err="1">
                 <a:solidFill>
                   <a:srgbClr val="030712"/>
                 </a:solidFill>
@@ -24445,7 +24609,7 @@
               <a:t>Métodos</a:t>
             </a:r>
             <a:r>
-              <a:rPr lang="en-GB" sz="1200" b="1" i="0" dirty="0">
+              <a:rPr lang="en-GB" sz="1100" b="1" i="0" dirty="0">
                 <a:solidFill>
                   <a:srgbClr val="030712"/>
                 </a:solidFill>
@@ -24455,7 +24619,7 @@
               <a:t> </a:t>
             </a:r>
             <a:r>
-              <a:rPr lang="en-GB" sz="1200" b="1" i="0" dirty="0" err="1">
+              <a:rPr lang="en-GB" sz="1100" b="1" i="0" dirty="0" err="1">
                 <a:solidFill>
                   <a:srgbClr val="030712"/>
                 </a:solidFill>
@@ -24465,7 +24629,7 @@
               <a:t>Probados</a:t>
             </a:r>
             <a:r>
-              <a:rPr lang="en-GB" sz="1200" b="1" i="0" dirty="0">
+              <a:rPr lang="en-GB" sz="1100" b="1" i="0" dirty="0">
                 <a:solidFill>
                   <a:srgbClr val="030712"/>
                 </a:solidFill>
@@ -24475,7 +24639,7 @@
               <a:t> </a:t>
             </a:r>
             <a:r>
-              <a:rPr lang="en-GB" sz="1200" b="1" i="0" dirty="0" err="1">
+              <a:rPr lang="en-GB" sz="1100" b="1" i="0" dirty="0" err="1">
                 <a:solidFill>
                   <a:srgbClr val="030712"/>
                 </a:solidFill>
@@ -24485,7 +24649,7 @@
               <a:t>Implementados</a:t>
             </a:r>
             <a:r>
-              <a:rPr lang="en-GB" sz="1200" b="1" i="0" dirty="0">
+              <a:rPr lang="en-GB" sz="1100" b="1" i="0" dirty="0">
                 <a:solidFill>
                   <a:srgbClr val="030712"/>
                 </a:solidFill>
@@ -24500,7 +24664,7 @@
               <a:buNone/>
             </a:pPr>
             <a:r>
-              <a:rPr lang="en-GB" sz="1200" b="1" i="0" dirty="0">
+              <a:rPr lang="en-GB" sz="1100" b="1" i="0" dirty="0">
                 <a:solidFill>
                   <a:srgbClr val="7F1D1D"/>
                 </a:solidFill>
@@ -24510,7 +24674,7 @@
               <a:t>- </a:t>
             </a:r>
             <a:r>
-              <a:rPr lang="en-GB" sz="1200" b="1" i="0" dirty="0" err="1">
+              <a:rPr lang="en-GB" sz="1100" b="1" i="0" dirty="0" err="1">
                 <a:solidFill>
                   <a:srgbClr val="7F1D1D"/>
                 </a:solidFill>
@@ -24520,7 +24684,7 @@
               <a:t>Imputación</a:t>
             </a:r>
             <a:r>
-              <a:rPr lang="en-GB" sz="1200" b="1" i="0" dirty="0">
+              <a:rPr lang="en-GB" sz="1100" b="1" i="0" dirty="0">
                 <a:solidFill>
                   <a:srgbClr val="7F1D1D"/>
                 </a:solidFill>
@@ -24535,7 +24699,7 @@
               <a:buNone/>
             </a:pPr>
             <a:r>
-              <a:rPr lang="en-GB" sz="1200" b="0" i="0" dirty="0">
+              <a:rPr lang="en-GB" sz="1100" b="0" i="0" dirty="0">
                 <a:solidFill>
                   <a:srgbClr val="4B5563"/>
                 </a:solidFill>
@@ -24545,7 +24709,7 @@
               <a:t>Media/</a:t>
             </a:r>
             <a:r>
-              <a:rPr lang="en-GB" sz="1200" b="0" i="0" dirty="0" err="1">
+              <a:rPr lang="en-GB" sz="1100" b="0" i="0" dirty="0" err="1">
                 <a:solidFill>
                   <a:srgbClr val="4B5563"/>
                 </a:solidFill>
@@ -24555,7 +24719,7 @@
               <a:t>mediana</a:t>
             </a:r>
             <a:r>
-              <a:rPr lang="en-GB" sz="1200" b="0" i="0" dirty="0">
+              <a:rPr lang="en-GB" sz="1100" b="0" i="0" dirty="0">
                 <a:solidFill>
                   <a:srgbClr val="4B5563"/>
                 </a:solidFill>
@@ -24565,7 +24729,7 @@
               <a:t>/</a:t>
             </a:r>
             <a:r>
-              <a:rPr lang="en-GB" sz="1200" b="0" i="0" dirty="0" err="1">
+              <a:rPr lang="en-GB" sz="1100" b="0" i="0" dirty="0" err="1">
                 <a:solidFill>
                   <a:srgbClr val="4B5563"/>
                 </a:solidFill>
@@ -24574,7 +24738,7 @@
               </a:rPr>
               <a:t>moda</a:t>
             </a:r>
-            <a:endParaRPr lang="en-GB" sz="1200" b="0" i="0" dirty="0">
+            <a:endParaRPr lang="en-GB" sz="1100" b="0" i="0" dirty="0">
               <a:solidFill>
                 <a:srgbClr val="4B5563"/>
               </a:solidFill>
@@ -24587,7 +24751,7 @@
               <a:buNone/>
             </a:pPr>
             <a:r>
-              <a:rPr lang="en-GB" sz="1200" b="0" i="1" dirty="0" err="1">
+              <a:rPr lang="en-GB" sz="1100" b="0" i="1" dirty="0" err="1">
                 <a:solidFill>
                   <a:srgbClr val="B91C1C"/>
                 </a:solidFill>
@@ -24597,7 +24761,7 @@
               <a:t>Distorsiona</a:t>
             </a:r>
             <a:r>
-              <a:rPr lang="en-GB" sz="1200" b="0" i="1" dirty="0">
+              <a:rPr lang="en-GB" sz="1100" b="0" i="1" dirty="0">
                 <a:solidFill>
                   <a:srgbClr val="B91C1C"/>
                 </a:solidFill>
@@ -24607,7 +24771,7 @@
               <a:t> </a:t>
             </a:r>
             <a:r>
-              <a:rPr lang="en-GB" sz="1200" b="0" i="1" dirty="0" err="1">
+              <a:rPr lang="en-GB" sz="1100" b="0" i="1" dirty="0" err="1">
                 <a:solidFill>
                   <a:srgbClr val="B91C1C"/>
                 </a:solidFill>
@@ -24616,7 +24780,7 @@
               </a:rPr>
               <a:t>distribuciones</a:t>
             </a:r>
-            <a:endParaRPr lang="en-GB" sz="1200" b="0" i="1" dirty="0">
+            <a:endParaRPr lang="en-GB" sz="1100" b="0" i="1" dirty="0">
               <a:solidFill>
                 <a:srgbClr val="B91C1C"/>
               </a:solidFill>
@@ -24633,7 +24797,7 @@
               <a:buChar char="-"/>
             </a:pPr>
             <a:r>
-              <a:rPr lang="en-GB" sz="1200" b="1" i="0" dirty="0">
+              <a:rPr lang="en-GB" sz="1100" b="1" i="0" dirty="0">
                 <a:solidFill>
                   <a:srgbClr val="713F12"/>
                 </a:solidFill>
@@ -24643,7 +24807,7 @@
               <a:t>KNN </a:t>
             </a:r>
             <a:r>
-              <a:rPr lang="en-GB" sz="1200" b="1" i="0" dirty="0" err="1">
+              <a:rPr lang="en-GB" sz="1100" b="1" i="0" dirty="0" err="1">
                 <a:solidFill>
                   <a:srgbClr val="713F12"/>
                 </a:solidFill>
@@ -24652,205 +24816,21 @@
               </a:rPr>
               <a:t>Multivariante</a:t>
             </a:r>
-            <a:endParaRPr lang="en-GB" sz="1200" b="1" dirty="0">
+            <a:endParaRPr lang="en-GB" sz="1100" b="1" dirty="0">
               <a:solidFill>
                 <a:srgbClr val="713F12"/>
               </a:solidFill>
               <a:latin typeface="ui-sans-serif"/>
             </a:endParaRPr>
           </a:p>
-          <a:p>
-            <a:pPr algn="l">
-              <a:spcBef>
-                <a:spcPts val="900"/>
-              </a:spcBef>
-            </a:pPr>
-            <a:r>
-              <a:rPr lang="en-GB" sz="1200" b="0" i="0" dirty="0">
-                <a:solidFill>
-                  <a:srgbClr val="4B5563"/>
-                </a:solidFill>
-                <a:effectLst/>
-                <a:latin typeface="ui-sans-serif"/>
-              </a:rPr>
-              <a:t>Mejor </a:t>
-            </a:r>
-            <a:r>
-              <a:rPr lang="en-GB" sz="1200" b="0" i="0" dirty="0" err="1">
-                <a:solidFill>
-                  <a:srgbClr val="4B5563"/>
-                </a:solidFill>
-                <a:effectLst/>
-                <a:latin typeface="ui-sans-serif"/>
-              </a:rPr>
-              <a:t>ajuste</a:t>
-            </a:r>
-            <a:r>
-              <a:rPr lang="en-GB" sz="1200" b="0" i="0" dirty="0">
-                <a:solidFill>
-                  <a:srgbClr val="4B5563"/>
-                </a:solidFill>
-                <a:effectLst/>
-                <a:latin typeface="ui-sans-serif"/>
-              </a:rPr>
-              <a:t>, </a:t>
-            </a:r>
-            <a:r>
-              <a:rPr lang="en-GB" sz="1200" b="0" i="0" dirty="0" err="1">
-                <a:solidFill>
-                  <a:srgbClr val="4B5563"/>
-                </a:solidFill>
-                <a:effectLst/>
-                <a:latin typeface="ui-sans-serif"/>
-              </a:rPr>
-              <a:t>pero</a:t>
-            </a:r>
-            <a:r>
-              <a:rPr lang="en-GB" sz="1200" b="0" i="0" dirty="0">
-                <a:solidFill>
-                  <a:srgbClr val="4B5563"/>
-                </a:solidFill>
-                <a:effectLst/>
-                <a:latin typeface="ui-sans-serif"/>
-              </a:rPr>
-              <a:t> </a:t>
-            </a:r>
-            <a:r>
-              <a:rPr lang="en-GB" sz="1200" b="0" i="0" dirty="0" err="1">
-                <a:solidFill>
-                  <a:srgbClr val="4B5563"/>
-                </a:solidFill>
-                <a:effectLst/>
-                <a:latin typeface="ui-sans-serif"/>
-              </a:rPr>
-              <a:t>mejorable</a:t>
-            </a:r>
-            <a:endParaRPr lang="en-GB" sz="1200" b="0" i="0" dirty="0">
-              <a:solidFill>
-                <a:srgbClr val="4B5563"/>
-              </a:solidFill>
-              <a:effectLst/>
-              <a:latin typeface="ui-sans-serif"/>
-            </a:endParaRPr>
-          </a:p>
-          <a:p>
-            <a:pPr algn="l">
-              <a:spcBef>
-                <a:spcPts val="900"/>
-              </a:spcBef>
-              <a:buNone/>
-            </a:pPr>
-            <a:r>
-              <a:rPr lang="en-GB" sz="1200" b="1" i="0" dirty="0">
-                <a:solidFill>
-                  <a:srgbClr val="14532D"/>
-                </a:solidFill>
-                <a:effectLst/>
-                <a:highlight>
-                  <a:srgbClr val="FFFF00"/>
-                </a:highlight>
-                <a:latin typeface="ui-sans-serif"/>
-              </a:rPr>
-              <a:t>- MICE (</a:t>
-            </a:r>
-            <a:r>
-              <a:rPr lang="en-GB" sz="1200" b="1" i="0" dirty="0" err="1">
-                <a:solidFill>
-                  <a:srgbClr val="14532D"/>
-                </a:solidFill>
-                <a:effectLst/>
-                <a:highlight>
-                  <a:srgbClr val="FFFF00"/>
-                </a:highlight>
-                <a:latin typeface="ui-sans-serif"/>
-              </a:rPr>
-              <a:t>Multivariante</a:t>
-            </a:r>
-            <a:r>
-              <a:rPr lang="en-GB" sz="1200" b="1" i="0" dirty="0">
-                <a:solidFill>
-                  <a:srgbClr val="14532D"/>
-                </a:solidFill>
-                <a:effectLst/>
-                <a:highlight>
-                  <a:srgbClr val="FFFF00"/>
-                </a:highlight>
-                <a:latin typeface="ui-sans-serif"/>
-              </a:rPr>
-              <a:t>)</a:t>
-            </a:r>
-          </a:p>
-          <a:p>
-            <a:pPr algn="l">
-              <a:spcBef>
-                <a:spcPts val="900"/>
-              </a:spcBef>
-              <a:buNone/>
-            </a:pPr>
-            <a:r>
-              <a:rPr lang="en-GB" sz="1200" b="0" i="0" dirty="0" err="1">
-                <a:solidFill>
-                  <a:srgbClr val="4B5563"/>
-                </a:solidFill>
-                <a:effectLst/>
-                <a:latin typeface="ui-sans-serif"/>
-              </a:rPr>
-              <a:t>Ajuste</a:t>
-            </a:r>
-            <a:r>
-              <a:rPr lang="en-GB" sz="1200" b="0" i="0" dirty="0">
-                <a:solidFill>
-                  <a:srgbClr val="4B5563"/>
-                </a:solidFill>
-                <a:effectLst/>
-                <a:latin typeface="ui-sans-serif"/>
-              </a:rPr>
-              <a:t> perfecto de </a:t>
-            </a:r>
-            <a:r>
-              <a:rPr lang="en-GB" sz="1200" b="0" i="0" dirty="0" err="1">
-                <a:solidFill>
-                  <a:srgbClr val="4B5563"/>
-                </a:solidFill>
-                <a:effectLst/>
-                <a:latin typeface="ui-sans-serif"/>
-              </a:rPr>
-              <a:t>distribuciones</a:t>
-            </a:r>
-            <a:endParaRPr lang="en-GB" sz="1200" b="0" i="0" dirty="0">
-              <a:solidFill>
-                <a:srgbClr val="4B5563"/>
-              </a:solidFill>
-              <a:effectLst/>
-              <a:latin typeface="ui-sans-serif"/>
-            </a:endParaRPr>
-          </a:p>
-          <a:p>
-            <a:pPr algn="l">
-              <a:spcBef>
-                <a:spcPts val="900"/>
-              </a:spcBef>
-              <a:buNone/>
-            </a:pPr>
-            <a:r>
-              <a:rPr lang="en-GB" sz="1200" b="1" i="0" dirty="0">
-                <a:solidFill>
-                  <a:srgbClr val="166534"/>
-                </a:solidFill>
-                <a:effectLst/>
-                <a:latin typeface="ui-sans-serif"/>
-              </a:rPr>
-              <a:t>✓ MÉTODO SELECCIONADO</a:t>
-            </a:r>
-          </a:p>
         </p:txBody>
       </p:sp>
       <p:sp>
         <p:nvSpPr>
-          <p:cNvPr id="10" name="TextBox 9">
+          <p:cNvPr id="5" name="TextBox 4">
             <a:extLst>
               <a:ext uri="{FF2B5EF4-FFF2-40B4-BE49-F238E27FC236}">
-                <a16:creationId xmlns:a16="http://schemas.microsoft.com/office/drawing/2014/main" id="{6B9214DE-8CE4-ADC1-4D89-4FDD571013F0}"/>
+                <a16:creationId xmlns:a16="http://schemas.microsoft.com/office/drawing/2014/main" id="{AEDDF397-5179-1ABA-E497-DB8D79140BF9}"/>
               </a:ext>
             </a:extLst>
           </p:cNvPr>
@@ -24859,8 +24839,278 @@
         </p:nvSpPr>
         <p:spPr>
           <a:xfrm>
-            <a:off x="3855856" y="3456052"/>
-            <a:ext cx="5169717" cy="1015663"/>
+            <a:off x="3832213" y="1046039"/>
+            <a:ext cx="3321538" cy="1331134"/>
+          </a:xfrm>
+          <a:prstGeom prst="rect">
+            <a:avLst/>
+          </a:prstGeom>
+          <a:noFill/>
+        </p:spPr>
+        <p:txBody>
+          <a:bodyPr wrap="square" rtlCol="0">
+            <a:spAutoFit/>
+          </a:bodyPr>
+          <a:lstStyle/>
+          <a:p>
+            <a:pPr>
+              <a:spcBef>
+                <a:spcPts val="900"/>
+              </a:spcBef>
+            </a:pPr>
+            <a:r>
+              <a:rPr lang="en-GB" sz="1100" dirty="0">
+                <a:solidFill>
+                  <a:srgbClr val="4B5563"/>
+                </a:solidFill>
+                <a:latin typeface="ui-sans-serif"/>
+              </a:rPr>
+              <a:t>Mejor </a:t>
+            </a:r>
+            <a:r>
+              <a:rPr lang="en-GB" sz="1100" dirty="0" err="1">
+                <a:solidFill>
+                  <a:srgbClr val="4B5563"/>
+                </a:solidFill>
+                <a:latin typeface="ui-sans-serif"/>
+              </a:rPr>
+              <a:t>ajuste</a:t>
+            </a:r>
+            <a:r>
+              <a:rPr lang="en-GB" sz="1100" dirty="0">
+                <a:solidFill>
+                  <a:srgbClr val="4B5563"/>
+                </a:solidFill>
+                <a:latin typeface="ui-sans-serif"/>
+              </a:rPr>
+              <a:t>, </a:t>
+            </a:r>
+            <a:r>
+              <a:rPr lang="en-GB" sz="1100" dirty="0" err="1">
+                <a:solidFill>
+                  <a:srgbClr val="4B5563"/>
+                </a:solidFill>
+                <a:latin typeface="ui-sans-serif"/>
+              </a:rPr>
+              <a:t>pero</a:t>
+            </a:r>
+            <a:r>
+              <a:rPr lang="en-GB" sz="1100" dirty="0">
+                <a:solidFill>
+                  <a:srgbClr val="4B5563"/>
+                </a:solidFill>
+                <a:latin typeface="ui-sans-serif"/>
+              </a:rPr>
+              <a:t> </a:t>
+            </a:r>
+            <a:r>
+              <a:rPr lang="en-GB" sz="1100" dirty="0" err="1">
+                <a:solidFill>
+                  <a:srgbClr val="4B5563"/>
+                </a:solidFill>
+                <a:latin typeface="ui-sans-serif"/>
+              </a:rPr>
+              <a:t>mejorable</a:t>
+            </a:r>
+            <a:endParaRPr lang="en-GB" sz="1100" dirty="0">
+              <a:solidFill>
+                <a:srgbClr val="4B5563"/>
+              </a:solidFill>
+              <a:latin typeface="ui-sans-serif"/>
+            </a:endParaRPr>
+          </a:p>
+          <a:p>
+            <a:pPr>
+              <a:spcBef>
+                <a:spcPts val="900"/>
+              </a:spcBef>
+            </a:pPr>
+            <a:r>
+              <a:rPr lang="en-GB" sz="1100" b="1" dirty="0">
+                <a:solidFill>
+                  <a:srgbClr val="14532D"/>
+                </a:solidFill>
+                <a:highlight>
+                  <a:srgbClr val="FFFF00"/>
+                </a:highlight>
+                <a:latin typeface="ui-sans-serif"/>
+              </a:rPr>
+              <a:t>- MICE (</a:t>
+            </a:r>
+            <a:r>
+              <a:rPr lang="en-GB" sz="1100" b="1" dirty="0" err="1">
+                <a:solidFill>
+                  <a:srgbClr val="14532D"/>
+                </a:solidFill>
+                <a:highlight>
+                  <a:srgbClr val="FFFF00"/>
+                </a:highlight>
+                <a:latin typeface="ui-sans-serif"/>
+              </a:rPr>
+              <a:t>Multivariante</a:t>
+            </a:r>
+            <a:r>
+              <a:rPr lang="en-GB" sz="1100" b="1" dirty="0">
+                <a:solidFill>
+                  <a:srgbClr val="14532D"/>
+                </a:solidFill>
+                <a:highlight>
+                  <a:srgbClr val="FFFF00"/>
+                </a:highlight>
+                <a:latin typeface="ui-sans-serif"/>
+              </a:rPr>
+              <a:t>)</a:t>
+            </a:r>
+          </a:p>
+          <a:p>
+            <a:pPr>
+              <a:spcBef>
+                <a:spcPts val="900"/>
+              </a:spcBef>
+            </a:pPr>
+            <a:r>
+              <a:rPr lang="en-GB" sz="1100" dirty="0" err="1">
+                <a:solidFill>
+                  <a:srgbClr val="4B5563"/>
+                </a:solidFill>
+                <a:latin typeface="ui-sans-serif"/>
+              </a:rPr>
+              <a:t>Ajuste</a:t>
+            </a:r>
+            <a:r>
+              <a:rPr lang="en-GB" sz="1100" dirty="0">
+                <a:solidFill>
+                  <a:srgbClr val="4B5563"/>
+                </a:solidFill>
+                <a:latin typeface="ui-sans-serif"/>
+              </a:rPr>
+              <a:t> perfecto de </a:t>
+            </a:r>
+            <a:r>
+              <a:rPr lang="en-GB" sz="1100" dirty="0" err="1">
+                <a:solidFill>
+                  <a:srgbClr val="4B5563"/>
+                </a:solidFill>
+                <a:latin typeface="ui-sans-serif"/>
+              </a:rPr>
+              <a:t>distribuciones</a:t>
+            </a:r>
+            <a:endParaRPr lang="en-GB" sz="1100" dirty="0">
+              <a:solidFill>
+                <a:srgbClr val="4B5563"/>
+              </a:solidFill>
+              <a:latin typeface="ui-sans-serif"/>
+            </a:endParaRPr>
+          </a:p>
+          <a:p>
+            <a:pPr>
+              <a:spcBef>
+                <a:spcPts val="900"/>
+              </a:spcBef>
+            </a:pPr>
+            <a:r>
+              <a:rPr lang="en-GB" sz="1100" b="1" dirty="0">
+                <a:solidFill>
+                  <a:srgbClr val="166534"/>
+                </a:solidFill>
+                <a:latin typeface="ui-sans-serif"/>
+              </a:rPr>
+              <a:t>✓ MÉTODO SELECCIONADO</a:t>
+            </a:r>
+          </a:p>
+          <a:p>
+            <a:endParaRPr lang="en-ES" dirty="0"/>
+          </a:p>
+        </p:txBody>
+      </p:sp>
+      <p:cxnSp>
+        <p:nvCxnSpPr>
+          <p:cNvPr id="9" name="Straight Connector 8">
+            <a:extLst>
+              <a:ext uri="{FF2B5EF4-FFF2-40B4-BE49-F238E27FC236}">
+                <a16:creationId xmlns:a16="http://schemas.microsoft.com/office/drawing/2014/main" id="{8F4C9136-E073-6DF3-B808-213004673361}"/>
+              </a:ext>
+            </a:extLst>
+          </p:cNvPr>
+          <p:cNvCxnSpPr/>
+          <p:nvPr/>
+        </p:nvCxnSpPr>
+        <p:spPr>
+          <a:xfrm>
+            <a:off x="2110153" y="590805"/>
+            <a:ext cx="0" cy="1594339"/>
+          </a:xfrm>
+          <a:prstGeom prst="line">
+            <a:avLst/>
+          </a:prstGeom>
+        </p:spPr>
+        <p:style>
+          <a:lnRef idx="1">
+            <a:schemeClr val="accent1"/>
+          </a:lnRef>
+          <a:fillRef idx="0">
+            <a:schemeClr val="accent1"/>
+          </a:fillRef>
+          <a:effectRef idx="0">
+            <a:schemeClr val="accent1"/>
+          </a:effectRef>
+          <a:fontRef idx="minor">
+            <a:schemeClr val="tx1"/>
+          </a:fontRef>
+        </p:style>
+      </p:cxnSp>
+      <p:cxnSp>
+        <p:nvCxnSpPr>
+          <p:cNvPr id="10" name="Straight Connector 9">
+            <a:extLst>
+              <a:ext uri="{FF2B5EF4-FFF2-40B4-BE49-F238E27FC236}">
+                <a16:creationId xmlns:a16="http://schemas.microsoft.com/office/drawing/2014/main" id="{EF071651-6029-0F9E-9E3D-55948F1B663B}"/>
+              </a:ext>
+            </a:extLst>
+          </p:cNvPr>
+          <p:cNvCxnSpPr/>
+          <p:nvPr/>
+        </p:nvCxnSpPr>
+        <p:spPr>
+          <a:xfrm>
+            <a:off x="5920153" y="661390"/>
+            <a:ext cx="0" cy="1594339"/>
+          </a:xfrm>
+          <a:prstGeom prst="line">
+            <a:avLst/>
+          </a:prstGeom>
+        </p:spPr>
+        <p:style>
+          <a:lnRef idx="1">
+            <a:schemeClr val="accent1"/>
+          </a:lnRef>
+          <a:fillRef idx="0">
+            <a:schemeClr val="accent1"/>
+          </a:fillRef>
+          <a:effectRef idx="0">
+            <a:schemeClr val="accent1"/>
+          </a:effectRef>
+          <a:fontRef idx="minor">
+            <a:schemeClr val="tx1"/>
+          </a:fontRef>
+        </p:style>
+      </p:cxnSp>
+      <p:sp>
+        <p:nvSpPr>
+          <p:cNvPr id="12" name="TextBox 11">
+            <a:extLst>
+              <a:ext uri="{FF2B5EF4-FFF2-40B4-BE49-F238E27FC236}">
+                <a16:creationId xmlns:a16="http://schemas.microsoft.com/office/drawing/2014/main" id="{D4F0584E-1220-C583-17A4-FF6564FB82C5}"/>
+              </a:ext>
+            </a:extLst>
+          </p:cNvPr>
+          <p:cNvSpPr txBox="1"/>
+          <p:nvPr/>
+        </p:nvSpPr>
+        <p:spPr>
+          <a:xfrm>
+            <a:off x="5942367" y="674103"/>
+            <a:ext cx="3044340" cy="1277273"/>
           </a:xfrm>
           <a:prstGeom prst="rect">
             <a:avLst/>
@@ -24875,37 +25125,32 @@
           <a:p>
             <a:pPr algn="just"/>
             <a:r>
-              <a:rPr lang="es-ES" sz="1200" i="1" dirty="0"/>
+              <a:rPr lang="es-ES" sz="1100" i="1" dirty="0"/>
               <a:t>Finalmente, tras aplicar el método </a:t>
             </a:r>
             <a:r>
-              <a:rPr lang="es-ES" sz="1200" b="1" i="1" dirty="0"/>
+              <a:rPr lang="es-ES" sz="1100" b="1" i="1" dirty="0"/>
               <a:t>MICE</a:t>
             </a:r>
             <a:r>
-              <a:rPr lang="es-ES" sz="1200" i="1" dirty="0"/>
+              <a:rPr lang="es-ES" sz="1100" i="1" dirty="0"/>
               <a:t> (multivariante), llegamos a unos resultados muy buenos, encontrando un ajuste prácticamente perfecto de las distribuciones. </a:t>
             </a:r>
           </a:p>
           <a:p>
             <a:pPr algn="just"/>
-            <a:endParaRPr lang="es-ES" sz="1200" i="1" dirty="0"/>
+            <a:endParaRPr lang="es-ES" sz="1100" i="1" dirty="0"/>
           </a:p>
           <a:p>
             <a:pPr algn="just"/>
             <a:r>
-              <a:rPr lang="es-ES" sz="1200" i="1" dirty="0"/>
+              <a:rPr lang="es-ES" sz="1100" i="1" dirty="0"/>
               <a:t>Se decidió validar el método y la base de datos imputada por MICE.</a:t>
             </a:r>
           </a:p>
         </p:txBody>
       </p:sp>
     </p:spTree>
-    <p:extLst>
-      <p:ext uri="{BB962C8B-B14F-4D97-AF65-F5344CB8AC3E}">
-        <p14:creationId xmlns:p14="http://schemas.microsoft.com/office/powerpoint/2010/main" val="1794189217"/>
-      </p:ext>
-    </p:extLst>
   </p:cSld>
   <p:clrMapOvr>
     <a:masterClrMapping/>
@@ -26553,131 +26798,6 @@
           <a:p>
             <a:pPr algn="ctr"/>
             <a:endParaRPr lang="es-ES"/>
-          </a:p>
-        </p:txBody>
-      </p:sp>
-      <p:sp>
-        <p:nvSpPr>
-          <p:cNvPr id="5" name="Rectangle 3">
-            <a:extLst>
-              <a:ext uri="{FF2B5EF4-FFF2-40B4-BE49-F238E27FC236}">
-                <a16:creationId xmlns:a16="http://schemas.microsoft.com/office/drawing/2014/main" id="{6F445AD4-12F0-F8AB-40F4-2087EDD7C509}"/>
-              </a:ext>
-            </a:extLst>
-          </p:cNvPr>
-          <p:cNvSpPr>
-            <a:spLocks noChangeArrowheads="1"/>
-          </p:cNvSpPr>
-          <p:nvPr/>
-        </p:nvSpPr>
-        <p:spPr bwMode="auto">
-          <a:xfrm>
-            <a:off x="0" y="-323165"/>
-            <a:ext cx="328936" cy="646331"/>
-          </a:xfrm>
-          <a:prstGeom prst="rect">
-            <a:avLst/>
-          </a:prstGeom>
-          <a:noFill/>
-          <a:ln>
-            <a:noFill/>
-          </a:ln>
-          <a:effectLst/>
-          <a:extLst>
-            <a:ext uri="{909E8E84-426E-40DD-AFC4-6F175D3DCCD1}">
-              <a14:hiddenFill xmlns:a14="http://schemas.microsoft.com/office/drawing/2010/main">
-                <a:solidFill>
-                  <a:schemeClr val="accent1"/>
-                </a:solidFill>
-              </a14:hiddenFill>
-            </a:ext>
-            <a:ext uri="{91240B29-F687-4F45-9708-019B960494DF}">
-              <a14:hiddenLine xmlns:a14="http://schemas.microsoft.com/office/drawing/2010/main" w="9525">
-                <a:solidFill>
-                  <a:schemeClr val="tx1"/>
-                </a:solidFill>
-                <a:miter lim="800000"/>
-                <a:headEnd/>
-                <a:tailEnd/>
-              </a14:hiddenLine>
-            </a:ext>
-            <a:ext uri="{AF507438-7753-43E0-B8FC-AC1667EBCBE1}">
-              <a14:hiddenEffects xmlns:a14="http://schemas.microsoft.com/office/drawing/2010/main">
-                <a:effectLst>
-                  <a:outerShdw dist="35921" dir="2700000" algn="ctr" rotWithShape="0">
-                    <a:schemeClr val="bg2"/>
-                  </a:outerShdw>
-                </a:effectLst>
-              </a14:hiddenEffects>
-            </a:ext>
-          </a:extLst>
-        </p:spPr>
-        <p:txBody>
-          <a:bodyPr vert="horz" wrap="none" lIns="91440" tIns="45720" rIns="91440" bIns="45720" numCol="1" anchor="ctr" anchorCtr="0" compatLnSpc="1">
-            <a:prstTxWarp prst="textNoShape">
-              <a:avLst/>
-            </a:prstTxWarp>
-            <a:spAutoFit/>
-          </a:bodyPr>
-          <a:lstStyle/>
-          <a:p>
-            <a:pPr marL="0" marR="0" lvl="0" indent="0" algn="l" defTabSz="914400" rtl="0" eaLnBrk="0" fontAlgn="base" latinLnBrk="0" hangingPunct="0">
-              <a:lnSpc>
-                <a:spcPct val="100000"/>
-              </a:lnSpc>
-              <a:spcBef>
-                <a:spcPct val="0"/>
-              </a:spcBef>
-              <a:spcAft>
-                <a:spcPct val="0"/>
-              </a:spcAft>
-              <a:buClrTx/>
-              <a:buSzTx/>
-              <a:buFontTx/>
-              <a:buChar char="•"/>
-              <a:tabLst/>
-            </a:pPr>
-            <a:r>
-              <a:rPr kumimoji="0" lang="en-ES" altLang="en-ES" sz="1800" b="0" i="0" u="none" strike="noStrike" cap="none" normalizeH="0" baseline="0" dirty="0">
-                <a:ln>
-                  <a:noFill/>
-                </a:ln>
-                <a:solidFill>
-                  <a:schemeClr val="tx1"/>
-                </a:solidFill>
-                <a:effectLst/>
-                <a:latin typeface="Arial" panose="020B0604020202020204" pitchFamily="34" charset="0"/>
-              </a:rPr>
-              <a:t>.</a:t>
-            </a:r>
-          </a:p>
-          <a:p>
-            <a:pPr marL="0" marR="0" lvl="0" indent="0" algn="l" defTabSz="914400" rtl="0" eaLnBrk="0" fontAlgn="base" latinLnBrk="0" hangingPunct="0">
-              <a:lnSpc>
-                <a:spcPct val="100000"/>
-              </a:lnSpc>
-              <a:spcBef>
-                <a:spcPct val="0"/>
-              </a:spcBef>
-              <a:spcAft>
-                <a:spcPct val="0"/>
-              </a:spcAft>
-              <a:buClrTx/>
-              <a:buSzTx/>
-              <a:buFontTx/>
-              <a:buChar char="•"/>
-              <a:tabLst/>
-            </a:pPr>
-            <a:endParaRPr kumimoji="0" lang="en-ES" altLang="en-ES" sz="1800" b="0" i="0" u="none" strike="noStrike" cap="none" normalizeH="0" baseline="0" dirty="0">
-              <a:ln>
-                <a:noFill/>
-              </a:ln>
-              <a:solidFill>
-                <a:schemeClr val="tx1"/>
-              </a:solidFill>
-              <a:effectLst/>
-              <a:latin typeface="Arial" panose="020B0604020202020204" pitchFamily="34" charset="0"/>
-            </a:endParaRPr>
           </a:p>
         </p:txBody>
       </p:sp>

</xml_diff>